<commit_message>
Successfully implement a vectorized version, resulting in an impressive 30x (slowdown)
</commit_message>
<xml_diff>
--- a/plots/Plots.pptx
+++ b/plots/Plots.pptx
@@ -36,6 +36,8 @@
     <p:sldId id="285" r:id="rId30"/>
     <p:sldId id="286" r:id="rId31"/>
     <p:sldId id="287" r:id="rId32"/>
+    <p:sldId id="288" r:id="rId33"/>
+    <p:sldId id="289" r:id="rId34"/>
   </p:sldIdLst>
   <p:sldSz cx="12192000" cy="6858000"/>
   <p:notesSz cx="6858000" cy="9144000"/>
@@ -289,7 +291,7 @@
           <a:p>
             <a:fld id="{E4B0A79A-3997-4F54-9D51-15EE0C15CBF2}" type="datetimeFigureOut">
               <a:rPr lang="en-US" smtClean="0"/>
-              <a:t>2024-08-11</a:t>
+              <a:t>2024-08-12</a:t>
             </a:fld>
             <a:endParaRPr lang="en-US"/>
           </a:p>
@@ -487,7 +489,7 @@
           <a:p>
             <a:fld id="{E4B0A79A-3997-4F54-9D51-15EE0C15CBF2}" type="datetimeFigureOut">
               <a:rPr lang="en-US" smtClean="0"/>
-              <a:t>2024-08-11</a:t>
+              <a:t>2024-08-12</a:t>
             </a:fld>
             <a:endParaRPr lang="en-US"/>
           </a:p>
@@ -695,7 +697,7 @@
           <a:p>
             <a:fld id="{E4B0A79A-3997-4F54-9D51-15EE0C15CBF2}" type="datetimeFigureOut">
               <a:rPr lang="en-US" smtClean="0"/>
-              <a:t>2024-08-11</a:t>
+              <a:t>2024-08-12</a:t>
             </a:fld>
             <a:endParaRPr lang="en-US"/>
           </a:p>
@@ -893,7 +895,7 @@
           <a:p>
             <a:fld id="{E4B0A79A-3997-4F54-9D51-15EE0C15CBF2}" type="datetimeFigureOut">
               <a:rPr lang="en-US" smtClean="0"/>
-              <a:t>2024-08-11</a:t>
+              <a:t>2024-08-12</a:t>
             </a:fld>
             <a:endParaRPr lang="en-US"/>
           </a:p>
@@ -1168,7 +1170,7 @@
           <a:p>
             <a:fld id="{E4B0A79A-3997-4F54-9D51-15EE0C15CBF2}" type="datetimeFigureOut">
               <a:rPr lang="en-US" smtClean="0"/>
-              <a:t>2024-08-11</a:t>
+              <a:t>2024-08-12</a:t>
             </a:fld>
             <a:endParaRPr lang="en-US"/>
           </a:p>
@@ -1433,7 +1435,7 @@
           <a:p>
             <a:fld id="{E4B0A79A-3997-4F54-9D51-15EE0C15CBF2}" type="datetimeFigureOut">
               <a:rPr lang="en-US" smtClean="0"/>
-              <a:t>2024-08-11</a:t>
+              <a:t>2024-08-12</a:t>
             </a:fld>
             <a:endParaRPr lang="en-US"/>
           </a:p>
@@ -1845,7 +1847,7 @@
           <a:p>
             <a:fld id="{E4B0A79A-3997-4F54-9D51-15EE0C15CBF2}" type="datetimeFigureOut">
               <a:rPr lang="en-US" smtClean="0"/>
-              <a:t>2024-08-11</a:t>
+              <a:t>2024-08-12</a:t>
             </a:fld>
             <a:endParaRPr lang="en-US"/>
           </a:p>
@@ -1986,7 +1988,7 @@
           <a:p>
             <a:fld id="{E4B0A79A-3997-4F54-9D51-15EE0C15CBF2}" type="datetimeFigureOut">
               <a:rPr lang="en-US" smtClean="0"/>
-              <a:t>2024-08-11</a:t>
+              <a:t>2024-08-12</a:t>
             </a:fld>
             <a:endParaRPr lang="en-US"/>
           </a:p>
@@ -2099,7 +2101,7 @@
           <a:p>
             <a:fld id="{E4B0A79A-3997-4F54-9D51-15EE0C15CBF2}" type="datetimeFigureOut">
               <a:rPr lang="en-US" smtClean="0"/>
-              <a:t>2024-08-11</a:t>
+              <a:t>2024-08-12</a:t>
             </a:fld>
             <a:endParaRPr lang="en-US"/>
           </a:p>
@@ -2410,7 +2412,7 @@
           <a:p>
             <a:fld id="{E4B0A79A-3997-4F54-9D51-15EE0C15CBF2}" type="datetimeFigureOut">
               <a:rPr lang="en-US" smtClean="0"/>
-              <a:t>2024-08-11</a:t>
+              <a:t>2024-08-12</a:t>
             </a:fld>
             <a:endParaRPr lang="en-US"/>
           </a:p>
@@ -2698,7 +2700,7 @@
           <a:p>
             <a:fld id="{E4B0A79A-3997-4F54-9D51-15EE0C15CBF2}" type="datetimeFigureOut">
               <a:rPr lang="en-US" smtClean="0"/>
-              <a:t>2024-08-11</a:t>
+              <a:t>2024-08-12</a:t>
             </a:fld>
             <a:endParaRPr lang="en-US"/>
           </a:p>
@@ -2939,7 +2941,7 @@
           <a:p>
             <a:fld id="{E4B0A79A-3997-4F54-9D51-15EE0C15CBF2}" type="datetimeFigureOut">
               <a:rPr lang="en-US" smtClean="0"/>
-              <a:t>2024-08-11</a:t>
+              <a:t>2024-08-12</a:t>
             </a:fld>
             <a:endParaRPr lang="en-US"/>
           </a:p>
@@ -8390,8 +8392,8 @@
           </a:p>
         </p:txBody>
       </p:sp>
-      <mc:AlternateContent xmlns:mc="http://schemas.openxmlformats.org/markup-compatibility/2006">
-        <mc:Choice xmlns:a14="http://schemas.microsoft.com/office/drawing/2010/main" Requires="a14">
+      <mc:AlternateContent xmlns:mc="http://schemas.openxmlformats.org/markup-compatibility/2006" xmlns:a14="http://schemas.microsoft.com/office/drawing/2010/main">
+        <mc:Choice Requires="a14">
           <p:sp>
             <p:nvSpPr>
               <p:cNvPr id="3" name="Content Placeholder 2">
@@ -8413,7 +8415,6 @@
               <a:bodyPr/>
               <a:lstStyle/>
               <a:p>
-                <a:pPr/>
                 <a14:m>
                   <m:oMath xmlns:m="http://schemas.openxmlformats.org/officeDocument/2006/math">
                     <m:r>
@@ -8493,7 +8494,6 @@
                 <a:endParaRPr lang="en-US" b="1" dirty="0"/>
               </a:p>
               <a:p>
-                <a:pPr/>
                 <a14:m>
                   <m:oMath xmlns:m="http://schemas.openxmlformats.org/officeDocument/2006/math">
                     <m:r>
@@ -8513,7 +8513,6 @@
                 <a:endParaRPr lang="en-US" dirty="0"/>
               </a:p>
               <a:p>
-                <a:pPr/>
                 <a14:m>
                   <m:oMath xmlns:m="http://schemas.openxmlformats.org/officeDocument/2006/math">
                     <m:r>
@@ -8539,7 +8538,6 @@
                 <a:endParaRPr lang="en-US" dirty="0"/>
               </a:p>
               <a:p>
-                <a:pPr/>
                 <a14:m>
                   <m:oMath xmlns:m="http://schemas.openxmlformats.org/officeDocument/2006/math">
                     <m:r>
@@ -8658,7 +8656,6 @@
                 <a:endParaRPr lang="en-US" b="1" dirty="0"/>
               </a:p>
               <a:p>
-                <a:pPr/>
                 <a14:m>
                   <m:oMath xmlns:m="http://schemas.openxmlformats.org/officeDocument/2006/math">
                     <m:r>
@@ -8708,7 +8705,7 @@
             </p:txBody>
           </p:sp>
         </mc:Choice>
-        <mc:Fallback>
+        <mc:Fallback xmlns="">
           <p:sp>
             <p:nvSpPr>
               <p:cNvPr id="3" name="Content Placeholder 2">
@@ -9447,6 +9444,735 @@
     <p:extLst>
       <p:ext uri="{BB962C8B-B14F-4D97-AF65-F5344CB8AC3E}">
         <p14:creationId xmlns:p14="http://schemas.microsoft.com/office/powerpoint/2010/main" val="1179906992"/>
+      </p:ext>
+    </p:extLst>
+  </p:cSld>
+  <p:clrMapOvr>
+    <a:masterClrMapping/>
+  </p:clrMapOvr>
+</p:sld>
+</file>
+
+<file path=ppt/slides/slide32.xml><?xml version="1.0" encoding="utf-8"?>
+<p:sld xmlns:a="http://schemas.openxmlformats.org/drawingml/2006/main" xmlns:r="http://schemas.openxmlformats.org/officeDocument/2006/relationships" xmlns:p="http://schemas.openxmlformats.org/presentationml/2006/main">
+  <p:cSld>
+    <p:spTree>
+      <p:nvGrpSpPr>
+        <p:cNvPr id="1" name=""/>
+        <p:cNvGrpSpPr/>
+        <p:nvPr/>
+      </p:nvGrpSpPr>
+      <p:grpSpPr>
+        <a:xfrm>
+          <a:off x="0" y="0"/>
+          <a:ext cx="0" cy="0"/>
+          <a:chOff x="0" y="0"/>
+          <a:chExt cx="0" cy="0"/>
+        </a:xfrm>
+      </p:grpSpPr>
+      <p:sp>
+        <p:nvSpPr>
+          <p:cNvPr id="2" name="Title 1">
+            <a:extLst>
+              <a:ext uri="{FF2B5EF4-FFF2-40B4-BE49-F238E27FC236}">
+                <a16:creationId xmlns:a16="http://schemas.microsoft.com/office/drawing/2014/main" id="{F7503490-B962-3F4F-EFAA-2B5007E24588}"/>
+              </a:ext>
+            </a:extLst>
+          </p:cNvPr>
+          <p:cNvSpPr>
+            <a:spLocks noGrp="1"/>
+          </p:cNvSpPr>
+          <p:nvPr>
+            <p:ph type="title"/>
+          </p:nvPr>
+        </p:nvSpPr>
+        <p:spPr/>
+        <p:txBody>
+          <a:bodyPr/>
+          <a:lstStyle/>
+          <a:p>
+            <a:r>
+              <a:rPr lang="en-US" dirty="0"/>
+              <a:t>Run 10 – extend run 8</a:t>
+            </a:r>
+          </a:p>
+        </p:txBody>
+      </p:sp>
+      <mc:AlternateContent xmlns:mc="http://schemas.openxmlformats.org/markup-compatibility/2006">
+        <mc:Choice xmlns:a14="http://schemas.microsoft.com/office/drawing/2010/main" Requires="a14">
+          <p:sp>
+            <p:nvSpPr>
+              <p:cNvPr id="4" name="Content Placeholder 2">
+                <a:extLst>
+                  <a:ext uri="{FF2B5EF4-FFF2-40B4-BE49-F238E27FC236}">
+                    <a16:creationId xmlns:a16="http://schemas.microsoft.com/office/drawing/2014/main" id="{762A52ED-5824-0E03-C594-148A5C5E6621}"/>
+                  </a:ext>
+                </a:extLst>
+              </p:cNvPr>
+              <p:cNvSpPr>
+                <a:spLocks noGrp="1"/>
+              </p:cNvSpPr>
+              <p:nvPr>
+                <p:ph idx="1"/>
+              </p:nvPr>
+            </p:nvSpPr>
+            <p:spPr>
+              <a:xfrm>
+                <a:off x="838200" y="1825625"/>
+                <a:ext cx="10515600" cy="4351338"/>
+              </a:xfrm>
+            </p:spPr>
+            <p:txBody>
+              <a:bodyPr/>
+              <a:lstStyle/>
+              <a:p>
+                <a14:m>
+                  <m:oMath xmlns:m="http://schemas.openxmlformats.org/officeDocument/2006/math">
+                    <m:r>
+                      <a:rPr lang="en-US" b="1" i="1" dirty="0" smtClean="0">
+                        <a:latin typeface="Cambria Math" panose="02040503050406030204" pitchFamily="18" charset="0"/>
+                      </a:rPr>
+                      <m:t>𝑳</m:t>
+                    </m:r>
+                    <m:r>
+                      <a:rPr lang="en-US" b="1" i="1" dirty="0" smtClean="0">
+                        <a:latin typeface="Cambria Math" panose="02040503050406030204" pitchFamily="18" charset="0"/>
+                      </a:rPr>
+                      <m:t>∈</m:t>
+                    </m:r>
+                    <m:r>
+                      <m:rPr>
+                        <m:lit/>
+                      </m:rPr>
+                      <a:rPr lang="en-US" b="1" i="1" dirty="0" smtClean="0">
+                        <a:latin typeface="Cambria Math" panose="02040503050406030204" pitchFamily="18" charset="0"/>
+                      </a:rPr>
+                      <m:t>{</m:t>
+                    </m:r>
+                    <m:r>
+                      <a:rPr lang="en-US" b="1" i="1" dirty="0" smtClean="0">
+                        <a:latin typeface="Cambria Math" panose="02040503050406030204" pitchFamily="18" charset="0"/>
+                      </a:rPr>
+                      <m:t>𝟏𝟏𝟎</m:t>
+                    </m:r>
+                    <m:r>
+                      <a:rPr lang="en-US" b="1" i="1" dirty="0" smtClean="0">
+                        <a:latin typeface="Cambria Math" panose="02040503050406030204" pitchFamily="18" charset="0"/>
+                      </a:rPr>
+                      <m:t>,</m:t>
+                    </m:r>
+                    <m:r>
+                      <a:rPr lang="en-US" b="1" i="1" dirty="0" smtClean="0">
+                        <a:latin typeface="Cambria Math" panose="02040503050406030204" pitchFamily="18" charset="0"/>
+                      </a:rPr>
+                      <m:t>𝟏𝟐𝟎</m:t>
+                    </m:r>
+                    <m:r>
+                      <a:rPr lang="en-US" b="1" i="1" dirty="0" smtClean="0">
+                        <a:latin typeface="Cambria Math" panose="02040503050406030204" pitchFamily="18" charset="0"/>
+                      </a:rPr>
+                      <m:t>,</m:t>
+                    </m:r>
+                    <m:r>
+                      <a:rPr lang="en-US" b="1" i="1" dirty="0" smtClean="0">
+                        <a:latin typeface="Cambria Math" panose="02040503050406030204" pitchFamily="18" charset="0"/>
+                      </a:rPr>
+                      <m:t>𝟏𝟑𝟎</m:t>
+                    </m:r>
+                    <m:r>
+                      <a:rPr lang="en-US" b="1" i="1" dirty="0" smtClean="0">
+                        <a:latin typeface="Cambria Math" panose="02040503050406030204" pitchFamily="18" charset="0"/>
+                      </a:rPr>
+                      <m:t>,…,</m:t>
+                    </m:r>
+                    <m:r>
+                      <a:rPr lang="en-US" b="1" i="1" dirty="0" smtClean="0">
+                        <a:latin typeface="Cambria Math" panose="02040503050406030204" pitchFamily="18" charset="0"/>
+                      </a:rPr>
+                      <m:t>𝟐𝟎𝟎</m:t>
+                    </m:r>
+                    <m:r>
+                      <m:rPr>
+                        <m:lit/>
+                      </m:rPr>
+                      <a:rPr lang="en-US" b="1" i="1" dirty="0" smtClean="0">
+                        <a:latin typeface="Cambria Math" panose="02040503050406030204" pitchFamily="18" charset="0"/>
+                      </a:rPr>
+                      <m:t>}</m:t>
+                    </m:r>
+                  </m:oMath>
+                </a14:m>
+                <a:endParaRPr lang="en-US" b="1" dirty="0"/>
+              </a:p>
+              <a:p>
+                <a14:m>
+                  <m:oMath xmlns:m="http://schemas.openxmlformats.org/officeDocument/2006/math">
+                    <m:r>
+                      <a:rPr lang="en-US" i="1" dirty="0" smtClean="0">
+                        <a:latin typeface="Cambria Math" panose="02040503050406030204" pitchFamily="18" charset="0"/>
+                      </a:rPr>
+                      <m:t>𝑐</m:t>
+                    </m:r>
+                    <m:r>
+                      <a:rPr lang="en-US" i="1" dirty="0" smtClean="0">
+                        <a:latin typeface="Cambria Math" panose="02040503050406030204" pitchFamily="18" charset="0"/>
+                      </a:rPr>
+                      <m:t>=16</m:t>
+                    </m:r>
+                  </m:oMath>
+                </a14:m>
+                <a:endParaRPr lang="en-US" dirty="0"/>
+              </a:p>
+              <a:p>
+                <a14:m>
+                  <m:oMath xmlns:m="http://schemas.openxmlformats.org/officeDocument/2006/math">
+                    <m:r>
+                      <a:rPr lang="en-US" i="1" dirty="0" smtClean="0">
+                        <a:latin typeface="Cambria Math" panose="02040503050406030204" pitchFamily="18" charset="0"/>
+                      </a:rPr>
+                      <m:t>𝑇</m:t>
+                    </m:r>
+                    <m:r>
+                      <a:rPr lang="en-US" i="1" dirty="0" smtClean="0">
+                        <a:latin typeface="Cambria Math" panose="02040503050406030204" pitchFamily="18" charset="0"/>
+                      </a:rPr>
+                      <m:t>=</m:t>
+                    </m:r>
+                    <m:r>
+                      <a:rPr lang="en-US" i="1" dirty="0" smtClean="0">
+                        <a:latin typeface="Cambria Math" panose="02040503050406030204" pitchFamily="18" charset="0"/>
+                      </a:rPr>
+                      <m:t>𝐿</m:t>
+                    </m:r>
+                  </m:oMath>
+                </a14:m>
+                <a:endParaRPr lang="en-US" dirty="0"/>
+              </a:p>
+              <a:p>
+                <a14:m>
+                  <m:oMath xmlns:m="http://schemas.openxmlformats.org/officeDocument/2006/math">
+                    <m:r>
+                      <a:rPr lang="en-US" b="0" i="1" dirty="0" smtClean="0">
+                        <a:latin typeface="Cambria Math" panose="02040503050406030204" pitchFamily="18" charset="0"/>
+                      </a:rPr>
+                      <m:t>𝑝</m:t>
+                    </m:r>
+                    <m:r>
+                      <a:rPr lang="en-US" b="0" i="1" dirty="0" smtClean="0">
+                        <a:latin typeface="Cambria Math" panose="02040503050406030204" pitchFamily="18" charset="0"/>
+                      </a:rPr>
+                      <m:t>=0.004</m:t>
+                    </m:r>
+                  </m:oMath>
+                </a14:m>
+                <a:endParaRPr lang="en-US" dirty="0"/>
+              </a:p>
+              <a:p>
+                <a14:m>
+                  <m:oMath xmlns:m="http://schemas.openxmlformats.org/officeDocument/2006/math">
+                    <m:r>
+                      <a:rPr lang="en-US" i="1" dirty="0" smtClean="0">
+                        <a:latin typeface="Cambria Math" panose="02040503050406030204" pitchFamily="18" charset="0"/>
+                      </a:rPr>
+                      <m:t>𝜂</m:t>
+                    </m:r>
+                    <m:r>
+                      <a:rPr lang="en-US" i="1" dirty="0" smtClean="0">
+                        <a:latin typeface="Cambria Math" panose="02040503050406030204" pitchFamily="18" charset="0"/>
+                      </a:rPr>
+                      <m:t>=0.1</m:t>
+                    </m:r>
+                  </m:oMath>
+                </a14:m>
+                <a:endParaRPr lang="en-US" dirty="0"/>
+              </a:p>
+              <a:p>
+                <a14:m>
+                  <m:oMath xmlns:m="http://schemas.openxmlformats.org/officeDocument/2006/math">
+                    <m:sSup>
+                      <m:sSupPr>
+                        <m:ctrlPr>
+                          <a:rPr lang="en-US" b="0" i="1" smtClean="0">
+                            <a:latin typeface="Cambria Math" panose="02040503050406030204" pitchFamily="18" charset="0"/>
+                          </a:rPr>
+                        </m:ctrlPr>
+                      </m:sSupPr>
+                      <m:e>
+                        <m:r>
+                          <a:rPr lang="en-US" b="0" i="1" smtClean="0">
+                            <a:latin typeface="Cambria Math" panose="02040503050406030204" pitchFamily="18" charset="0"/>
+                          </a:rPr>
+                          <m:t>10</m:t>
+                        </m:r>
+                      </m:e>
+                      <m:sup>
+                        <m:r>
+                          <a:rPr lang="en-US" b="0" i="1" smtClean="0">
+                            <a:latin typeface="Cambria Math" panose="02040503050406030204" pitchFamily="18" charset="0"/>
+                          </a:rPr>
+                          <m:t>7</m:t>
+                        </m:r>
+                      </m:sup>
+                    </m:sSup>
+                  </m:oMath>
+                </a14:m>
+                <a:r>
+                  <a:rPr lang="en-US" dirty="0"/>
+                  <a:t> shots (100000 x 100)</a:t>
+                </a:r>
+              </a:p>
+              <a:p>
+                <a:r>
+                  <a:rPr lang="en-US" dirty="0"/>
+                  <a:t>4 hours, 10 CPUs / task</a:t>
+                </a:r>
+              </a:p>
+            </p:txBody>
+          </p:sp>
+        </mc:Choice>
+        <mc:Fallback>
+          <p:sp>
+            <p:nvSpPr>
+              <p:cNvPr id="4" name="Content Placeholder 2">
+                <a:extLst>
+                  <a:ext uri="{FF2B5EF4-FFF2-40B4-BE49-F238E27FC236}">
+                    <a16:creationId xmlns:a16="http://schemas.microsoft.com/office/drawing/2014/main" id="{762A52ED-5824-0E03-C594-148A5C5E6621}"/>
+                  </a:ext>
+                </a:extLst>
+              </p:cNvPr>
+              <p:cNvSpPr>
+                <a:spLocks noGrp="1" noRot="1" noChangeAspect="1" noMove="1" noResize="1" noEditPoints="1" noAdjustHandles="1" noChangeArrowheads="1" noChangeShapeType="1" noTextEdit="1"/>
+              </p:cNvSpPr>
+              <p:nvPr>
+                <p:ph idx="1"/>
+              </p:nvPr>
+            </p:nvSpPr>
+            <p:spPr>
+              <a:xfrm>
+                <a:off x="838200" y="1825625"/>
+                <a:ext cx="10515600" cy="4351338"/>
+              </a:xfrm>
+              <a:blipFill>
+                <a:blip r:embed="rId2"/>
+                <a:stretch>
+                  <a:fillRect l="-1043"/>
+                </a:stretch>
+              </a:blipFill>
+            </p:spPr>
+            <p:txBody>
+              <a:bodyPr/>
+              <a:lstStyle/>
+              <a:p>
+                <a:r>
+                  <a:rPr lang="en-US">
+                    <a:noFill/>
+                  </a:rPr>
+                  <a:t> </a:t>
+                </a:r>
+              </a:p>
+            </p:txBody>
+          </p:sp>
+        </mc:Fallback>
+      </mc:AlternateContent>
+    </p:spTree>
+    <p:extLst>
+      <p:ext uri="{BB962C8B-B14F-4D97-AF65-F5344CB8AC3E}">
+        <p14:creationId xmlns:p14="http://schemas.microsoft.com/office/powerpoint/2010/main" val="2759465199"/>
+      </p:ext>
+    </p:extLst>
+  </p:cSld>
+  <p:clrMapOvr>
+    <a:masterClrMapping/>
+  </p:clrMapOvr>
+</p:sld>
+</file>
+
+<file path=ppt/slides/slide33.xml><?xml version="1.0" encoding="utf-8"?>
+<p:sld xmlns:a="http://schemas.openxmlformats.org/drawingml/2006/main" xmlns:r="http://schemas.openxmlformats.org/officeDocument/2006/relationships" xmlns:p="http://schemas.openxmlformats.org/presentationml/2006/main">
+  <p:cSld>
+    <p:spTree>
+      <p:nvGrpSpPr>
+        <p:cNvPr id="1" name=""/>
+        <p:cNvGrpSpPr/>
+        <p:nvPr/>
+      </p:nvGrpSpPr>
+      <p:grpSpPr>
+        <a:xfrm>
+          <a:off x="0" y="0"/>
+          <a:ext cx="0" cy="0"/>
+          <a:chOff x="0" y="0"/>
+          <a:chExt cx="0" cy="0"/>
+        </a:xfrm>
+      </p:grpSpPr>
+      <p:sp>
+        <p:nvSpPr>
+          <p:cNvPr id="2" name="Title 1">
+            <a:extLst>
+              <a:ext uri="{FF2B5EF4-FFF2-40B4-BE49-F238E27FC236}">
+                <a16:creationId xmlns:a16="http://schemas.microsoft.com/office/drawing/2014/main" id="{B797A52D-8C56-4CC5-48D0-88D222D029E4}"/>
+              </a:ext>
+            </a:extLst>
+          </p:cNvPr>
+          <p:cNvSpPr>
+            <a:spLocks noGrp="1"/>
+          </p:cNvSpPr>
+          <p:nvPr>
+            <p:ph type="title"/>
+          </p:nvPr>
+        </p:nvSpPr>
+        <p:spPr/>
+        <p:txBody>
+          <a:bodyPr/>
+          <a:lstStyle/>
+          <a:p>
+            <a:r>
+              <a:rPr lang="en-US" dirty="0"/>
+              <a:t>Run 11 – steady state</a:t>
+            </a:r>
+          </a:p>
+        </p:txBody>
+      </p:sp>
+      <mc:AlternateContent xmlns:mc="http://schemas.openxmlformats.org/markup-compatibility/2006">
+        <mc:Choice xmlns:a14="http://schemas.microsoft.com/office/drawing/2010/main" Requires="a14">
+          <p:sp>
+            <p:nvSpPr>
+              <p:cNvPr id="3" name="Content Placeholder 2">
+                <a:extLst>
+                  <a:ext uri="{FF2B5EF4-FFF2-40B4-BE49-F238E27FC236}">
+                    <a16:creationId xmlns:a16="http://schemas.microsoft.com/office/drawing/2014/main" id="{F567ADB7-F744-B166-BEF6-BB2549F8A4D4}"/>
+                  </a:ext>
+                </a:extLst>
+              </p:cNvPr>
+              <p:cNvSpPr>
+                <a:spLocks noGrp="1"/>
+              </p:cNvSpPr>
+              <p:nvPr>
+                <p:ph idx="1"/>
+              </p:nvPr>
+            </p:nvSpPr>
+            <p:spPr/>
+            <p:txBody>
+              <a:bodyPr/>
+              <a:lstStyle/>
+              <a:p>
+                <a14:m>
+                  <m:oMath xmlns:m="http://schemas.openxmlformats.org/officeDocument/2006/math">
+                    <m:r>
+                      <a:rPr lang="en-US" b="1" i="1" dirty="0" smtClean="0">
+                        <a:latin typeface="Cambria Math" panose="02040503050406030204" pitchFamily="18" charset="0"/>
+                      </a:rPr>
+                      <m:t>𝑳</m:t>
+                    </m:r>
+                    <m:r>
+                      <a:rPr lang="en-US" b="1" i="1" dirty="0" smtClean="0">
+                        <a:latin typeface="Cambria Math" panose="02040503050406030204" pitchFamily="18" charset="0"/>
+                      </a:rPr>
+                      <m:t>∈</m:t>
+                    </m:r>
+                    <m:r>
+                      <m:rPr>
+                        <m:lit/>
+                      </m:rPr>
+                      <a:rPr lang="en-US" b="1" i="1" dirty="0" smtClean="0">
+                        <a:latin typeface="Cambria Math" panose="02040503050406030204" pitchFamily="18" charset="0"/>
+                      </a:rPr>
+                      <m:t>{</m:t>
+                    </m:r>
+                    <m:r>
+                      <a:rPr lang="en-US" b="1" i="1" dirty="0" smtClean="0">
+                        <a:latin typeface="Cambria Math" panose="02040503050406030204" pitchFamily="18" charset="0"/>
+                      </a:rPr>
+                      <m:t>𝟐𝟎</m:t>
+                    </m:r>
+                    <m:r>
+                      <a:rPr lang="en-US" b="1" i="1" dirty="0" smtClean="0">
+                        <a:latin typeface="Cambria Math" panose="02040503050406030204" pitchFamily="18" charset="0"/>
+                      </a:rPr>
+                      <m:t>,</m:t>
+                    </m:r>
+                    <m:r>
+                      <a:rPr lang="en-US" b="1" i="1" dirty="0" smtClean="0">
+                        <a:latin typeface="Cambria Math" panose="02040503050406030204" pitchFamily="18" charset="0"/>
+                      </a:rPr>
+                      <m:t>𝟒𝟎</m:t>
+                    </m:r>
+                    <m:r>
+                      <a:rPr lang="en-US" b="1" i="1" dirty="0" smtClean="0">
+                        <a:latin typeface="Cambria Math" panose="02040503050406030204" pitchFamily="18" charset="0"/>
+                      </a:rPr>
+                      <m:t>,</m:t>
+                    </m:r>
+                    <m:r>
+                      <a:rPr lang="en-US" b="1" i="1" dirty="0" smtClean="0">
+                        <a:latin typeface="Cambria Math" panose="02040503050406030204" pitchFamily="18" charset="0"/>
+                      </a:rPr>
+                      <m:t>𝟔𝟎</m:t>
+                    </m:r>
+                    <m:r>
+                      <a:rPr lang="en-US" b="1" i="1" dirty="0" smtClean="0">
+                        <a:latin typeface="Cambria Math" panose="02040503050406030204" pitchFamily="18" charset="0"/>
+                      </a:rPr>
+                      <m:t>,…,</m:t>
+                    </m:r>
+                    <m:r>
+                      <a:rPr lang="en-US" b="1" i="1" dirty="0" smtClean="0">
+                        <a:latin typeface="Cambria Math" panose="02040503050406030204" pitchFamily="18" charset="0"/>
+                      </a:rPr>
+                      <m:t>𝟏𝟎𝟎</m:t>
+                    </m:r>
+                    <m:r>
+                      <m:rPr>
+                        <m:lit/>
+                      </m:rPr>
+                      <a:rPr lang="en-US" b="1" i="1" dirty="0" smtClean="0">
+                        <a:latin typeface="Cambria Math" panose="02040503050406030204" pitchFamily="18" charset="0"/>
+                      </a:rPr>
+                      <m:t>}</m:t>
+                    </m:r>
+                  </m:oMath>
+                </a14:m>
+                <a:endParaRPr lang="en-US" b="1" dirty="0"/>
+              </a:p>
+              <a:p>
+                <a14:m>
+                  <m:oMath xmlns:m="http://schemas.openxmlformats.org/officeDocument/2006/math">
+                    <m:r>
+                      <a:rPr lang="en-US" i="1" dirty="0" smtClean="0">
+                        <a:latin typeface="Cambria Math" panose="02040503050406030204" pitchFamily="18" charset="0"/>
+                      </a:rPr>
+                      <m:t>𝑐</m:t>
+                    </m:r>
+                    <m:r>
+                      <a:rPr lang="en-US" i="1" dirty="0" smtClean="0">
+                        <a:latin typeface="Cambria Math" panose="02040503050406030204" pitchFamily="18" charset="0"/>
+                      </a:rPr>
+                      <m:t>=16</m:t>
+                    </m:r>
+                  </m:oMath>
+                </a14:m>
+                <a:endParaRPr lang="en-US" dirty="0"/>
+              </a:p>
+              <a:p>
+                <a14:m>
+                  <m:oMath xmlns:m="http://schemas.openxmlformats.org/officeDocument/2006/math">
+                    <m:r>
+                      <a:rPr lang="en-US" i="1" dirty="0" smtClean="0">
+                        <a:latin typeface="Cambria Math" panose="02040503050406030204" pitchFamily="18" charset="0"/>
+                      </a:rPr>
+                      <m:t>𝑇</m:t>
+                    </m:r>
+                    <m:r>
+                      <a:rPr lang="en-US" i="1" dirty="0" smtClean="0">
+                        <a:latin typeface="Cambria Math" panose="02040503050406030204" pitchFamily="18" charset="0"/>
+                      </a:rPr>
+                      <m:t>=5</m:t>
+                    </m:r>
+                    <m:r>
+                      <a:rPr lang="en-US" i="1" dirty="0" smtClean="0">
+                        <a:latin typeface="Cambria Math" panose="02040503050406030204" pitchFamily="18" charset="0"/>
+                      </a:rPr>
+                      <m:t>𝐿</m:t>
+                    </m:r>
+                  </m:oMath>
+                </a14:m>
+                <a:endParaRPr lang="en-US" dirty="0"/>
+              </a:p>
+              <a:p>
+                <a14:m>
+                  <m:oMath xmlns:m="http://schemas.openxmlformats.org/officeDocument/2006/math">
+                    <m:r>
+                      <a:rPr lang="en-US" b="1" i="1" dirty="0" smtClean="0">
+                        <a:latin typeface="Cambria Math" panose="02040503050406030204" pitchFamily="18" charset="0"/>
+                      </a:rPr>
+                      <m:t>𝒑</m:t>
+                    </m:r>
+                    <m:r>
+                      <a:rPr lang="en-US" b="1" i="1" dirty="0" smtClean="0">
+                        <a:latin typeface="Cambria Math" panose="02040503050406030204" pitchFamily="18" charset="0"/>
+                      </a:rPr>
+                      <m:t>∈{</m:t>
+                    </m:r>
+                    <m:r>
+                      <a:rPr lang="en-US" b="1" i="1" dirty="0" smtClean="0">
+                        <a:latin typeface="Cambria Math" panose="02040503050406030204" pitchFamily="18" charset="0"/>
+                      </a:rPr>
+                      <m:t>𝟎</m:t>
+                    </m:r>
+                    <m:r>
+                      <a:rPr lang="en-US" b="1" i="1" dirty="0" smtClean="0">
+                        <a:latin typeface="Cambria Math" panose="02040503050406030204" pitchFamily="18" charset="0"/>
+                      </a:rPr>
+                      <m:t>.</m:t>
+                    </m:r>
+                    <m:r>
+                      <a:rPr lang="en-US" b="1" i="1" dirty="0" smtClean="0">
+                        <a:latin typeface="Cambria Math" panose="02040503050406030204" pitchFamily="18" charset="0"/>
+                      </a:rPr>
+                      <m:t>𝟎𝟎𝟒𝟎</m:t>
+                    </m:r>
+                    <m:r>
+                      <a:rPr lang="en-US" b="1" i="1" dirty="0" smtClean="0">
+                        <a:latin typeface="Cambria Math" panose="02040503050406030204" pitchFamily="18" charset="0"/>
+                      </a:rPr>
+                      <m:t>,</m:t>
+                    </m:r>
+                    <m:r>
+                      <a:rPr lang="en-US" b="1" i="1" dirty="0" smtClean="0">
+                        <a:latin typeface="Cambria Math" panose="02040503050406030204" pitchFamily="18" charset="0"/>
+                      </a:rPr>
+                      <m:t>𝟎</m:t>
+                    </m:r>
+                    <m:r>
+                      <a:rPr lang="en-US" b="1" i="1" dirty="0" smtClean="0">
+                        <a:latin typeface="Cambria Math" panose="02040503050406030204" pitchFamily="18" charset="0"/>
+                      </a:rPr>
+                      <m:t>.</m:t>
+                    </m:r>
+                    <m:r>
+                      <a:rPr lang="en-US" b="1" i="1" dirty="0" smtClean="0">
+                        <a:latin typeface="Cambria Math" panose="02040503050406030204" pitchFamily="18" charset="0"/>
+                      </a:rPr>
+                      <m:t>𝟎𝟎𝟒𝟏</m:t>
+                    </m:r>
+                    <m:r>
+                      <a:rPr lang="en-US" b="1" i="1" dirty="0" smtClean="0">
+                        <a:latin typeface="Cambria Math" panose="02040503050406030204" pitchFamily="18" charset="0"/>
+                      </a:rPr>
+                      <m:t>,</m:t>
+                    </m:r>
+                    <m:r>
+                      <a:rPr lang="en-US" b="1" i="1" dirty="0" smtClean="0">
+                        <a:latin typeface="Cambria Math" panose="02040503050406030204" pitchFamily="18" charset="0"/>
+                      </a:rPr>
+                      <m:t>𝟎</m:t>
+                    </m:r>
+                    <m:r>
+                      <a:rPr lang="en-US" b="1" i="1" dirty="0" smtClean="0">
+                        <a:latin typeface="Cambria Math" panose="02040503050406030204" pitchFamily="18" charset="0"/>
+                      </a:rPr>
+                      <m:t>.</m:t>
+                    </m:r>
+                    <m:r>
+                      <a:rPr lang="en-US" b="1" i="1" dirty="0" smtClean="0">
+                        <a:latin typeface="Cambria Math" panose="02040503050406030204" pitchFamily="18" charset="0"/>
+                      </a:rPr>
+                      <m:t>𝟎𝟎𝟒𝟐</m:t>
+                    </m:r>
+                    <m:r>
+                      <a:rPr lang="en-US" b="1" i="1" dirty="0" smtClean="0">
+                        <a:latin typeface="Cambria Math" panose="02040503050406030204" pitchFamily="18" charset="0"/>
+                      </a:rPr>
+                      <m:t>,…,</m:t>
+                    </m:r>
+                    <m:r>
+                      <a:rPr lang="en-US" b="1" i="1" dirty="0" smtClean="0">
+                        <a:latin typeface="Cambria Math" panose="02040503050406030204" pitchFamily="18" charset="0"/>
+                      </a:rPr>
+                      <m:t>𝟎</m:t>
+                    </m:r>
+                    <m:r>
+                      <a:rPr lang="en-US" b="1" i="1" dirty="0" smtClean="0">
+                        <a:latin typeface="Cambria Math" panose="02040503050406030204" pitchFamily="18" charset="0"/>
+                      </a:rPr>
+                      <m:t>.</m:t>
+                    </m:r>
+                    <m:r>
+                      <a:rPr lang="en-US" b="1" i="1" dirty="0" smtClean="0">
+                        <a:latin typeface="Cambria Math" panose="02040503050406030204" pitchFamily="18" charset="0"/>
+                      </a:rPr>
+                      <m:t>𝟎𝟎𝟓𝟗</m:t>
+                    </m:r>
+                    <m:r>
+                      <m:rPr>
+                        <m:lit/>
+                      </m:rPr>
+                      <a:rPr lang="en-US" b="1" i="1" dirty="0" smtClean="0">
+                        <a:latin typeface="Cambria Math" panose="02040503050406030204" pitchFamily="18" charset="0"/>
+                      </a:rPr>
+                      <m:t>}</m:t>
+                    </m:r>
+                  </m:oMath>
+                </a14:m>
+                <a:endParaRPr lang="en-US" b="1" dirty="0"/>
+              </a:p>
+              <a:p>
+                <a14:m>
+                  <m:oMath xmlns:m="http://schemas.openxmlformats.org/officeDocument/2006/math">
+                    <m:r>
+                      <a:rPr lang="en-US" i="1" dirty="0" smtClean="0">
+                        <a:latin typeface="Cambria Math" panose="02040503050406030204" pitchFamily="18" charset="0"/>
+                      </a:rPr>
+                      <m:t>𝜂</m:t>
+                    </m:r>
+                    <m:r>
+                      <a:rPr lang="en-US" i="1" dirty="0" smtClean="0">
+                        <a:latin typeface="Cambria Math" panose="02040503050406030204" pitchFamily="18" charset="0"/>
+                      </a:rPr>
+                      <m:t>=0.1</m:t>
+                    </m:r>
+                  </m:oMath>
+                </a14:m>
+                <a:endParaRPr lang="en-US" dirty="0"/>
+              </a:p>
+              <a:p>
+                <a:r>
+                  <a:rPr lang="en-US" dirty="0"/>
+                  <a:t>1000000 shots (100000 x 10)</a:t>
+                </a:r>
+              </a:p>
+              <a:p>
+                <a:r>
+                  <a:rPr lang="en-US" dirty="0"/>
+                  <a:t>3 hours, 10 CPUs / task</a:t>
+                </a:r>
+              </a:p>
+            </p:txBody>
+          </p:sp>
+        </mc:Choice>
+        <mc:Fallback>
+          <p:sp>
+            <p:nvSpPr>
+              <p:cNvPr id="3" name="Content Placeholder 2">
+                <a:extLst>
+                  <a:ext uri="{FF2B5EF4-FFF2-40B4-BE49-F238E27FC236}">
+                    <a16:creationId xmlns:a16="http://schemas.microsoft.com/office/drawing/2014/main" id="{F567ADB7-F744-B166-BEF6-BB2549F8A4D4}"/>
+                  </a:ext>
+                </a:extLst>
+              </p:cNvPr>
+              <p:cNvSpPr>
+                <a:spLocks noGrp="1" noRot="1" noChangeAspect="1" noMove="1" noResize="1" noEditPoints="1" noAdjustHandles="1" noChangeArrowheads="1" noChangeShapeType="1" noTextEdit="1"/>
+              </p:cNvSpPr>
+              <p:nvPr>
+                <p:ph idx="1"/>
+              </p:nvPr>
+            </p:nvSpPr>
+            <p:spPr>
+              <a:blipFill>
+                <a:blip r:embed="rId2"/>
+                <a:stretch>
+                  <a:fillRect l="-1043"/>
+                </a:stretch>
+              </a:blipFill>
+            </p:spPr>
+            <p:txBody>
+              <a:bodyPr/>
+              <a:lstStyle/>
+              <a:p>
+                <a:r>
+                  <a:rPr lang="en-US">
+                    <a:noFill/>
+                  </a:rPr>
+                  <a:t> </a:t>
+                </a:r>
+              </a:p>
+            </p:txBody>
+          </p:sp>
+        </mc:Fallback>
+      </mc:AlternateContent>
+    </p:spTree>
+    <p:extLst>
+      <p:ext uri="{BB962C8B-B14F-4D97-AF65-F5344CB8AC3E}">
+        <p14:creationId xmlns:p14="http://schemas.microsoft.com/office/powerpoint/2010/main" val="642214071"/>
       </p:ext>
     </p:extLst>
   </p:cSld>

</xml_diff>

<commit_message>
process run 11 & prep run 12
</commit_message>
<xml_diff>
--- a/plots/Plots.pptx
+++ b/plots/Plots.pptx
@@ -39,6 +39,9 @@
     <p:sldId id="288" r:id="rId33"/>
     <p:sldId id="289" r:id="rId34"/>
     <p:sldId id="290" r:id="rId35"/>
+    <p:sldId id="291" r:id="rId36"/>
+    <p:sldId id="293" r:id="rId37"/>
+    <p:sldId id="292" r:id="rId38"/>
   </p:sldIdLst>
   <p:sldSz cx="12192000" cy="6858000"/>
   <p:notesSz cx="6858000" cy="9144000"/>
@@ -292,7 +295,7 @@
           <a:p>
             <a:fld id="{E4B0A79A-3997-4F54-9D51-15EE0C15CBF2}" type="datetimeFigureOut">
               <a:rPr lang="en-US" smtClean="0"/>
-              <a:t>2024-08-28</a:t>
+              <a:t>2024-08-29</a:t>
             </a:fld>
             <a:endParaRPr lang="en-US"/>
           </a:p>
@@ -490,7 +493,7 @@
           <a:p>
             <a:fld id="{E4B0A79A-3997-4F54-9D51-15EE0C15CBF2}" type="datetimeFigureOut">
               <a:rPr lang="en-US" smtClean="0"/>
-              <a:t>2024-08-28</a:t>
+              <a:t>2024-08-29</a:t>
             </a:fld>
             <a:endParaRPr lang="en-US"/>
           </a:p>
@@ -698,7 +701,7 @@
           <a:p>
             <a:fld id="{E4B0A79A-3997-4F54-9D51-15EE0C15CBF2}" type="datetimeFigureOut">
               <a:rPr lang="en-US" smtClean="0"/>
-              <a:t>2024-08-28</a:t>
+              <a:t>2024-08-29</a:t>
             </a:fld>
             <a:endParaRPr lang="en-US"/>
           </a:p>
@@ -896,7 +899,7 @@
           <a:p>
             <a:fld id="{E4B0A79A-3997-4F54-9D51-15EE0C15CBF2}" type="datetimeFigureOut">
               <a:rPr lang="en-US" smtClean="0"/>
-              <a:t>2024-08-28</a:t>
+              <a:t>2024-08-29</a:t>
             </a:fld>
             <a:endParaRPr lang="en-US"/>
           </a:p>
@@ -1171,7 +1174,7 @@
           <a:p>
             <a:fld id="{E4B0A79A-3997-4F54-9D51-15EE0C15CBF2}" type="datetimeFigureOut">
               <a:rPr lang="en-US" smtClean="0"/>
-              <a:t>2024-08-28</a:t>
+              <a:t>2024-08-29</a:t>
             </a:fld>
             <a:endParaRPr lang="en-US"/>
           </a:p>
@@ -1436,7 +1439,7 @@
           <a:p>
             <a:fld id="{E4B0A79A-3997-4F54-9D51-15EE0C15CBF2}" type="datetimeFigureOut">
               <a:rPr lang="en-US" smtClean="0"/>
-              <a:t>2024-08-28</a:t>
+              <a:t>2024-08-29</a:t>
             </a:fld>
             <a:endParaRPr lang="en-US"/>
           </a:p>
@@ -1848,7 +1851,7 @@
           <a:p>
             <a:fld id="{E4B0A79A-3997-4F54-9D51-15EE0C15CBF2}" type="datetimeFigureOut">
               <a:rPr lang="en-US" smtClean="0"/>
-              <a:t>2024-08-28</a:t>
+              <a:t>2024-08-29</a:t>
             </a:fld>
             <a:endParaRPr lang="en-US"/>
           </a:p>
@@ -1989,7 +1992,7 @@
           <a:p>
             <a:fld id="{E4B0A79A-3997-4F54-9D51-15EE0C15CBF2}" type="datetimeFigureOut">
               <a:rPr lang="en-US" smtClean="0"/>
-              <a:t>2024-08-28</a:t>
+              <a:t>2024-08-29</a:t>
             </a:fld>
             <a:endParaRPr lang="en-US"/>
           </a:p>
@@ -2102,7 +2105,7 @@
           <a:p>
             <a:fld id="{E4B0A79A-3997-4F54-9D51-15EE0C15CBF2}" type="datetimeFigureOut">
               <a:rPr lang="en-US" smtClean="0"/>
-              <a:t>2024-08-28</a:t>
+              <a:t>2024-08-29</a:t>
             </a:fld>
             <a:endParaRPr lang="en-US"/>
           </a:p>
@@ -2413,7 +2416,7 @@
           <a:p>
             <a:fld id="{E4B0A79A-3997-4F54-9D51-15EE0C15CBF2}" type="datetimeFigureOut">
               <a:rPr lang="en-US" smtClean="0"/>
-              <a:t>2024-08-28</a:t>
+              <a:t>2024-08-29</a:t>
             </a:fld>
             <a:endParaRPr lang="en-US"/>
           </a:p>
@@ -2701,7 +2704,7 @@
           <a:p>
             <a:fld id="{E4B0A79A-3997-4F54-9D51-15EE0C15CBF2}" type="datetimeFigureOut">
               <a:rPr lang="en-US" smtClean="0"/>
-              <a:t>2024-08-28</a:t>
+              <a:t>2024-08-29</a:t>
             </a:fld>
             <a:endParaRPr lang="en-US"/>
           </a:p>
@@ -2942,7 +2945,7 @@
           <a:p>
             <a:fld id="{E4B0A79A-3997-4F54-9D51-15EE0C15CBF2}" type="datetimeFigureOut">
               <a:rPr lang="en-US" smtClean="0"/>
-              <a:t>2024-08-28</a:t>
+              <a:t>2024-08-29</a:t>
             </a:fld>
             <a:endParaRPr lang="en-US"/>
           </a:p>
@@ -9499,8 +9502,8 @@
           </a:p>
         </p:txBody>
       </p:sp>
-      <mc:AlternateContent xmlns:mc="http://schemas.openxmlformats.org/markup-compatibility/2006">
-        <mc:Choice xmlns:a14="http://schemas.microsoft.com/office/drawing/2010/main" Requires="a14">
+      <mc:AlternateContent xmlns:mc="http://schemas.openxmlformats.org/markup-compatibility/2006" xmlns:a14="http://schemas.microsoft.com/office/drawing/2010/main">
+        <mc:Choice Requires="a14">
           <p:sp>
             <p:nvSpPr>
               <p:cNvPr id="3" name="Content Placeholder 2">
@@ -9790,7 +9793,7 @@
             </p:txBody>
           </p:sp>
         </mc:Choice>
-        <mc:Fallback>
+        <mc:Fallback xmlns="">
           <p:sp>
             <p:nvSpPr>
               <p:cNvPr id="3" name="Content Placeholder 2">
@@ -10056,6 +10059,832 @@
     <p:extLst>
       <p:ext uri="{BB962C8B-B14F-4D97-AF65-F5344CB8AC3E}">
         <p14:creationId xmlns:p14="http://schemas.microsoft.com/office/powerpoint/2010/main" val="2898255887"/>
+      </p:ext>
+    </p:extLst>
+  </p:cSld>
+  <p:clrMapOvr>
+    <a:masterClrMapping/>
+  </p:clrMapOvr>
+</p:sld>
+</file>
+
+<file path=ppt/slides/slide35.xml><?xml version="1.0" encoding="utf-8"?>
+<p:sld xmlns:a="http://schemas.openxmlformats.org/drawingml/2006/main" xmlns:r="http://schemas.openxmlformats.org/officeDocument/2006/relationships" xmlns:p="http://schemas.openxmlformats.org/presentationml/2006/main">
+  <p:cSld>
+    <p:spTree>
+      <p:nvGrpSpPr>
+        <p:cNvPr id="1" name=""/>
+        <p:cNvGrpSpPr/>
+        <p:nvPr/>
+      </p:nvGrpSpPr>
+      <p:grpSpPr>
+        <a:xfrm>
+          <a:off x="0" y="0"/>
+          <a:ext cx="0" cy="0"/>
+          <a:chOff x="0" y="0"/>
+          <a:chExt cx="0" cy="0"/>
+        </a:xfrm>
+      </p:grpSpPr>
+      <p:sp>
+        <p:nvSpPr>
+          <p:cNvPr id="2" name="Title 1">
+            <a:extLst>
+              <a:ext uri="{FF2B5EF4-FFF2-40B4-BE49-F238E27FC236}">
+                <a16:creationId xmlns:a16="http://schemas.microsoft.com/office/drawing/2014/main" id="{B797A52D-8C56-4CC5-48D0-88D222D029E4}"/>
+              </a:ext>
+            </a:extLst>
+          </p:cNvPr>
+          <p:cNvSpPr>
+            <a:spLocks noGrp="1"/>
+          </p:cNvSpPr>
+          <p:nvPr>
+            <p:ph type="title"/>
+          </p:nvPr>
+        </p:nvSpPr>
+        <p:spPr/>
+        <p:txBody>
+          <a:bodyPr/>
+          <a:lstStyle/>
+          <a:p>
+            <a:r>
+              <a:rPr lang="en-US" dirty="0"/>
+              <a:t>Run 11</a:t>
+            </a:r>
+          </a:p>
+        </p:txBody>
+      </p:sp>
+      <mc:AlternateContent xmlns:mc="http://schemas.openxmlformats.org/markup-compatibility/2006">
+        <mc:Choice xmlns:a14="http://schemas.microsoft.com/office/drawing/2010/main" Requires="a14">
+          <p:sp>
+            <p:nvSpPr>
+              <p:cNvPr id="3" name="Content Placeholder 2">
+                <a:extLst>
+                  <a:ext uri="{FF2B5EF4-FFF2-40B4-BE49-F238E27FC236}">
+                    <a16:creationId xmlns:a16="http://schemas.microsoft.com/office/drawing/2014/main" id="{F567ADB7-F744-B166-BEF6-BB2549F8A4D4}"/>
+                  </a:ext>
+                </a:extLst>
+              </p:cNvPr>
+              <p:cNvSpPr>
+                <a:spLocks noGrp="1"/>
+              </p:cNvSpPr>
+              <p:nvPr>
+                <p:ph idx="1"/>
+              </p:nvPr>
+            </p:nvSpPr>
+            <p:spPr/>
+            <p:txBody>
+              <a:bodyPr/>
+              <a:lstStyle/>
+              <a:p>
+                <a14:m>
+                  <m:oMath xmlns:m="http://schemas.openxmlformats.org/officeDocument/2006/math">
+                    <m:r>
+                      <a:rPr lang="en-US" b="1" i="1" dirty="0" smtClean="0">
+                        <a:latin typeface="Cambria Math" panose="02040503050406030204" pitchFamily="18" charset="0"/>
+                      </a:rPr>
+                      <m:t>𝑳</m:t>
+                    </m:r>
+                    <m:r>
+                      <a:rPr lang="en-US" b="1" i="1" dirty="0" smtClean="0">
+                        <a:latin typeface="Cambria Math" panose="02040503050406030204" pitchFamily="18" charset="0"/>
+                      </a:rPr>
+                      <m:t>∈</m:t>
+                    </m:r>
+                    <m:r>
+                      <m:rPr>
+                        <m:lit/>
+                      </m:rPr>
+                      <a:rPr lang="en-US" b="1" i="1" dirty="0" smtClean="0">
+                        <a:latin typeface="Cambria Math" panose="02040503050406030204" pitchFamily="18" charset="0"/>
+                      </a:rPr>
+                      <m:t>{</m:t>
+                    </m:r>
+                    <m:r>
+                      <a:rPr lang="en-US" b="1" i="1" dirty="0" smtClean="0">
+                        <a:latin typeface="Cambria Math" panose="02040503050406030204" pitchFamily="18" charset="0"/>
+                      </a:rPr>
+                      <m:t>𝟏𝟎𝟎</m:t>
+                    </m:r>
+                    <m:r>
+                      <a:rPr lang="en-US" b="1" i="1" dirty="0" smtClean="0">
+                        <a:latin typeface="Cambria Math" panose="02040503050406030204" pitchFamily="18" charset="0"/>
+                      </a:rPr>
+                      <m:t>,</m:t>
+                    </m:r>
+                    <m:r>
+                      <a:rPr lang="en-US" b="1" i="1" dirty="0" smtClean="0">
+                        <a:latin typeface="Cambria Math" panose="02040503050406030204" pitchFamily="18" charset="0"/>
+                      </a:rPr>
+                      <m:t>𝟐𝟎𝟎</m:t>
+                    </m:r>
+                    <m:r>
+                      <a:rPr lang="en-US" b="1" i="1" dirty="0" smtClean="0">
+                        <a:latin typeface="Cambria Math" panose="02040503050406030204" pitchFamily="18" charset="0"/>
+                      </a:rPr>
+                      <m:t>,</m:t>
+                    </m:r>
+                    <m:r>
+                      <a:rPr lang="en-US" b="1" i="1" dirty="0" smtClean="0">
+                        <a:latin typeface="Cambria Math" panose="02040503050406030204" pitchFamily="18" charset="0"/>
+                      </a:rPr>
+                      <m:t>𝟑𝟎𝟎</m:t>
+                    </m:r>
+                    <m:r>
+                      <a:rPr lang="en-US" b="1" i="1" dirty="0" smtClean="0">
+                        <a:latin typeface="Cambria Math" panose="02040503050406030204" pitchFamily="18" charset="0"/>
+                      </a:rPr>
+                      <m:t>,…,</m:t>
+                    </m:r>
+                    <m:r>
+                      <a:rPr lang="en-US" b="1" i="1" dirty="0" smtClean="0">
+                        <a:latin typeface="Cambria Math" panose="02040503050406030204" pitchFamily="18" charset="0"/>
+                      </a:rPr>
+                      <m:t>𝟓𝟎𝟎</m:t>
+                    </m:r>
+                    <m:r>
+                      <m:rPr>
+                        <m:lit/>
+                      </m:rPr>
+                      <a:rPr lang="en-US" b="1" i="1" dirty="0" smtClean="0">
+                        <a:latin typeface="Cambria Math" panose="02040503050406030204" pitchFamily="18" charset="0"/>
+                      </a:rPr>
+                      <m:t>}</m:t>
+                    </m:r>
+                  </m:oMath>
+                </a14:m>
+                <a:endParaRPr lang="en-US" b="1" dirty="0"/>
+              </a:p>
+              <a:p>
+                <a14:m>
+                  <m:oMath xmlns:m="http://schemas.openxmlformats.org/officeDocument/2006/math">
+                    <m:r>
+                      <a:rPr lang="en-US" i="1" dirty="0" smtClean="0">
+                        <a:latin typeface="Cambria Math" panose="02040503050406030204" pitchFamily="18" charset="0"/>
+                      </a:rPr>
+                      <m:t>𝑐</m:t>
+                    </m:r>
+                    <m:r>
+                      <a:rPr lang="en-US" i="1" dirty="0" smtClean="0">
+                        <a:latin typeface="Cambria Math" panose="02040503050406030204" pitchFamily="18" charset="0"/>
+                      </a:rPr>
+                      <m:t>=16</m:t>
+                    </m:r>
+                  </m:oMath>
+                </a14:m>
+                <a:endParaRPr lang="en-US" dirty="0"/>
+              </a:p>
+              <a:p>
+                <a14:m>
+                  <m:oMath xmlns:m="http://schemas.openxmlformats.org/officeDocument/2006/math">
+                    <m:r>
+                      <a:rPr lang="en-US" i="1" dirty="0" smtClean="0">
+                        <a:latin typeface="Cambria Math" panose="02040503050406030204" pitchFamily="18" charset="0"/>
+                      </a:rPr>
+                      <m:t>𝑇</m:t>
+                    </m:r>
+                    <m:r>
+                      <a:rPr lang="en-US" i="1" dirty="0" smtClean="0">
+                        <a:latin typeface="Cambria Math" panose="02040503050406030204" pitchFamily="18" charset="0"/>
+                      </a:rPr>
+                      <m:t>=</m:t>
+                    </m:r>
+                    <m:r>
+                      <a:rPr lang="en-US" i="1" dirty="0" smtClean="0">
+                        <a:latin typeface="Cambria Math" panose="02040503050406030204" pitchFamily="18" charset="0"/>
+                      </a:rPr>
+                      <m:t>𝐿</m:t>
+                    </m:r>
+                  </m:oMath>
+                </a14:m>
+                <a:endParaRPr lang="en-US" dirty="0"/>
+              </a:p>
+              <a:p>
+                <a14:m>
+                  <m:oMath xmlns:m="http://schemas.openxmlformats.org/officeDocument/2006/math">
+                    <m:r>
+                      <a:rPr lang="en-US" b="1" i="1" dirty="0" smtClean="0">
+                        <a:latin typeface="Cambria Math" panose="02040503050406030204" pitchFamily="18" charset="0"/>
+                      </a:rPr>
+                      <m:t>𝒑</m:t>
+                    </m:r>
+                    <m:r>
+                      <a:rPr lang="en-US" b="1" i="1" dirty="0" smtClean="0">
+                        <a:latin typeface="Cambria Math" panose="02040503050406030204" pitchFamily="18" charset="0"/>
+                      </a:rPr>
+                      <m:t>=</m:t>
+                    </m:r>
+                    <m:r>
+                      <a:rPr lang="en-US" b="1" i="1" dirty="0" smtClean="0">
+                        <a:latin typeface="Cambria Math" panose="02040503050406030204" pitchFamily="18" charset="0"/>
+                      </a:rPr>
+                      <m:t>𝟎</m:t>
+                    </m:r>
+                    <m:r>
+                      <a:rPr lang="en-US" b="1" i="1" dirty="0" smtClean="0">
+                        <a:latin typeface="Cambria Math" panose="02040503050406030204" pitchFamily="18" charset="0"/>
+                      </a:rPr>
+                      <m:t>.</m:t>
+                    </m:r>
+                    <m:r>
+                      <a:rPr lang="en-US" b="1" i="1" dirty="0" smtClean="0">
+                        <a:latin typeface="Cambria Math" panose="02040503050406030204" pitchFamily="18" charset="0"/>
+                      </a:rPr>
+                      <m:t>𝟎𝟎𝟑𝟓</m:t>
+                    </m:r>
+                  </m:oMath>
+                </a14:m>
+                <a:endParaRPr lang="en-US" b="1" dirty="0"/>
+              </a:p>
+              <a:p>
+                <a14:m>
+                  <m:oMath xmlns:m="http://schemas.openxmlformats.org/officeDocument/2006/math">
+                    <m:r>
+                      <a:rPr lang="en-US" i="1" dirty="0" smtClean="0">
+                        <a:latin typeface="Cambria Math" panose="02040503050406030204" pitchFamily="18" charset="0"/>
+                      </a:rPr>
+                      <m:t>𝜂</m:t>
+                    </m:r>
+                    <m:r>
+                      <a:rPr lang="en-US" i="1" dirty="0" smtClean="0">
+                        <a:latin typeface="Cambria Math" panose="02040503050406030204" pitchFamily="18" charset="0"/>
+                      </a:rPr>
+                      <m:t>=0.1</m:t>
+                    </m:r>
+                  </m:oMath>
+                </a14:m>
+                <a:endParaRPr lang="en-US" dirty="0"/>
+              </a:p>
+              <a:p>
+                <a:r>
+                  <a:rPr lang="en-US" dirty="0"/>
+                  <a:t>1.5 hours, 1 GPU / task</a:t>
+                </a:r>
+              </a:p>
+            </p:txBody>
+          </p:sp>
+        </mc:Choice>
+        <mc:Fallback>
+          <p:sp>
+            <p:nvSpPr>
+              <p:cNvPr id="3" name="Content Placeholder 2">
+                <a:extLst>
+                  <a:ext uri="{FF2B5EF4-FFF2-40B4-BE49-F238E27FC236}">
+                    <a16:creationId xmlns:a16="http://schemas.microsoft.com/office/drawing/2014/main" id="{F567ADB7-F744-B166-BEF6-BB2549F8A4D4}"/>
+                  </a:ext>
+                </a:extLst>
+              </p:cNvPr>
+              <p:cNvSpPr>
+                <a:spLocks noGrp="1" noRot="1" noChangeAspect="1" noMove="1" noResize="1" noEditPoints="1" noAdjustHandles="1" noChangeArrowheads="1" noChangeShapeType="1" noTextEdit="1"/>
+              </p:cNvSpPr>
+              <p:nvPr>
+                <p:ph idx="1"/>
+              </p:nvPr>
+            </p:nvSpPr>
+            <p:spPr>
+              <a:blipFill>
+                <a:blip r:embed="rId2"/>
+                <a:stretch>
+                  <a:fillRect l="-1043"/>
+                </a:stretch>
+              </a:blipFill>
+            </p:spPr>
+            <p:txBody>
+              <a:bodyPr/>
+              <a:lstStyle/>
+              <a:p>
+                <a:r>
+                  <a:rPr lang="en-US">
+                    <a:noFill/>
+                  </a:rPr>
+                  <a:t> </a:t>
+                </a:r>
+              </a:p>
+            </p:txBody>
+          </p:sp>
+        </mc:Fallback>
+      </mc:AlternateContent>
+    </p:spTree>
+    <p:extLst>
+      <p:ext uri="{BB962C8B-B14F-4D97-AF65-F5344CB8AC3E}">
+        <p14:creationId xmlns:p14="http://schemas.microsoft.com/office/powerpoint/2010/main" val="3181837282"/>
+      </p:ext>
+    </p:extLst>
+  </p:cSld>
+  <p:clrMapOvr>
+    <a:masterClrMapping/>
+  </p:clrMapOvr>
+</p:sld>
+</file>
+
+<file path=ppt/slides/slide36.xml><?xml version="1.0" encoding="utf-8"?>
+<p:sld xmlns:a="http://schemas.openxmlformats.org/drawingml/2006/main" xmlns:r="http://schemas.openxmlformats.org/officeDocument/2006/relationships" xmlns:p="http://schemas.openxmlformats.org/presentationml/2006/main">
+  <p:cSld>
+    <p:spTree>
+      <p:nvGrpSpPr>
+        <p:cNvPr id="1" name=""/>
+        <p:cNvGrpSpPr/>
+        <p:nvPr/>
+      </p:nvGrpSpPr>
+      <p:grpSpPr>
+        <a:xfrm>
+          <a:off x="0" y="0"/>
+          <a:ext cx="0" cy="0"/>
+          <a:chOff x="0" y="0"/>
+          <a:chExt cx="0" cy="0"/>
+        </a:xfrm>
+      </p:grpSpPr>
+      <p:sp>
+        <p:nvSpPr>
+          <p:cNvPr id="2" name="Title 1">
+            <a:extLst>
+              <a:ext uri="{FF2B5EF4-FFF2-40B4-BE49-F238E27FC236}">
+                <a16:creationId xmlns:a16="http://schemas.microsoft.com/office/drawing/2014/main" id="{22A558BB-BEFF-6DDF-AC55-D34E490005FC}"/>
+              </a:ext>
+            </a:extLst>
+          </p:cNvPr>
+          <p:cNvSpPr>
+            <a:spLocks noGrp="1"/>
+          </p:cNvSpPr>
+          <p:nvPr>
+            <p:ph type="title"/>
+          </p:nvPr>
+        </p:nvSpPr>
+        <p:spPr/>
+        <p:txBody>
+          <a:bodyPr/>
+          <a:lstStyle/>
+          <a:p>
+            <a:r>
+              <a:rPr lang="en-US" dirty="0"/>
+              <a:t>Run 11</a:t>
+            </a:r>
+          </a:p>
+        </p:txBody>
+      </p:sp>
+      <p:pic>
+        <p:nvPicPr>
+          <p:cNvPr id="5" name="Content Placeholder 4" descr="A screen shot of a graph&#10;&#10;Description automatically generated">
+            <a:extLst>
+              <a:ext uri="{FF2B5EF4-FFF2-40B4-BE49-F238E27FC236}">
+                <a16:creationId xmlns:a16="http://schemas.microsoft.com/office/drawing/2014/main" id="{80ABE1E1-B71B-032B-D44E-F2C7E23C4377}"/>
+              </a:ext>
+            </a:extLst>
+          </p:cNvPr>
+          <p:cNvPicPr>
+            <a:picLocks noGrp="1" noChangeAspect="1"/>
+          </p:cNvPicPr>
+          <p:nvPr>
+            <p:ph idx="1"/>
+          </p:nvPr>
+        </p:nvPicPr>
+        <p:blipFill>
+          <a:blip r:embed="rId2">
+            <a:extLst>
+              <a:ext uri="{28A0092B-C50C-407E-A947-70E740481C1C}">
+                <a14:useLocalDpi xmlns:a14="http://schemas.microsoft.com/office/drawing/2010/main" val="0"/>
+              </a:ext>
+            </a:extLst>
+          </a:blip>
+          <a:stretch>
+            <a:fillRect/>
+          </a:stretch>
+        </p:blipFill>
+        <p:spPr>
+          <a:xfrm>
+            <a:off x="6001747" y="1452835"/>
+            <a:ext cx="6190253" cy="4708388"/>
+          </a:xfrm>
+        </p:spPr>
+      </p:pic>
+      <p:pic>
+        <p:nvPicPr>
+          <p:cNvPr id="7" name="Picture 6" descr="A graph of a triangle&#10;&#10;Description automatically generated">
+            <a:extLst>
+              <a:ext uri="{FF2B5EF4-FFF2-40B4-BE49-F238E27FC236}">
+                <a16:creationId xmlns:a16="http://schemas.microsoft.com/office/drawing/2014/main" id="{E751FDBA-4A2C-8C88-462F-36E861369F4E}"/>
+              </a:ext>
+            </a:extLst>
+          </p:cNvPr>
+          <p:cNvPicPr>
+            <a:picLocks noChangeAspect="1"/>
+          </p:cNvPicPr>
+          <p:nvPr/>
+        </p:nvPicPr>
+        <p:blipFill>
+          <a:blip r:embed="rId3">
+            <a:extLst>
+              <a:ext uri="{28A0092B-C50C-407E-A947-70E740481C1C}">
+                <a14:useLocalDpi xmlns:a14="http://schemas.microsoft.com/office/drawing/2010/main" val="0"/>
+              </a:ext>
+            </a:extLst>
+          </a:blip>
+          <a:stretch>
+            <a:fillRect/>
+          </a:stretch>
+        </p:blipFill>
+        <p:spPr>
+          <a:xfrm>
+            <a:off x="72189" y="1510587"/>
+            <a:ext cx="5861761" cy="4708389"/>
+          </a:xfrm>
+          <a:prstGeom prst="rect">
+            <a:avLst/>
+          </a:prstGeom>
+        </p:spPr>
+      </p:pic>
+    </p:spTree>
+    <p:extLst>
+      <p:ext uri="{BB962C8B-B14F-4D97-AF65-F5344CB8AC3E}">
+        <p14:creationId xmlns:p14="http://schemas.microsoft.com/office/powerpoint/2010/main" val="562643231"/>
+      </p:ext>
+    </p:extLst>
+  </p:cSld>
+  <p:clrMapOvr>
+    <a:masterClrMapping/>
+  </p:clrMapOvr>
+</p:sld>
+</file>
+
+<file path=ppt/slides/slide37.xml><?xml version="1.0" encoding="utf-8"?>
+<p:sld xmlns:a="http://schemas.openxmlformats.org/drawingml/2006/main" xmlns:r="http://schemas.openxmlformats.org/officeDocument/2006/relationships" xmlns:p="http://schemas.openxmlformats.org/presentationml/2006/main">
+  <p:cSld>
+    <p:spTree>
+      <p:nvGrpSpPr>
+        <p:cNvPr id="1" name=""/>
+        <p:cNvGrpSpPr/>
+        <p:nvPr/>
+      </p:nvGrpSpPr>
+      <p:grpSpPr>
+        <a:xfrm>
+          <a:off x="0" y="0"/>
+          <a:ext cx="0" cy="0"/>
+          <a:chOff x="0" y="0"/>
+          <a:chExt cx="0" cy="0"/>
+        </a:xfrm>
+      </p:grpSpPr>
+      <p:sp>
+        <p:nvSpPr>
+          <p:cNvPr id="2" name="Title 1">
+            <a:extLst>
+              <a:ext uri="{FF2B5EF4-FFF2-40B4-BE49-F238E27FC236}">
+                <a16:creationId xmlns:a16="http://schemas.microsoft.com/office/drawing/2014/main" id="{B797A52D-8C56-4CC5-48D0-88D222D029E4}"/>
+              </a:ext>
+            </a:extLst>
+          </p:cNvPr>
+          <p:cNvSpPr>
+            <a:spLocks noGrp="1"/>
+          </p:cNvSpPr>
+          <p:nvPr>
+            <p:ph type="title"/>
+          </p:nvPr>
+        </p:nvSpPr>
+        <p:spPr/>
+        <p:txBody>
+          <a:bodyPr/>
+          <a:lstStyle/>
+          <a:p>
+            <a:r>
+              <a:rPr lang="en-US" dirty="0"/>
+              <a:t>Run 12</a:t>
+            </a:r>
+          </a:p>
+        </p:txBody>
+      </p:sp>
+      <mc:AlternateContent xmlns:mc="http://schemas.openxmlformats.org/markup-compatibility/2006">
+        <mc:Choice xmlns:a14="http://schemas.microsoft.com/office/drawing/2010/main" Requires="a14">
+          <p:sp>
+            <p:nvSpPr>
+              <p:cNvPr id="3" name="Content Placeholder 2">
+                <a:extLst>
+                  <a:ext uri="{FF2B5EF4-FFF2-40B4-BE49-F238E27FC236}">
+                    <a16:creationId xmlns:a16="http://schemas.microsoft.com/office/drawing/2014/main" id="{F567ADB7-F744-B166-BEF6-BB2549F8A4D4}"/>
+                  </a:ext>
+                </a:extLst>
+              </p:cNvPr>
+              <p:cNvSpPr>
+                <a:spLocks noGrp="1"/>
+              </p:cNvSpPr>
+              <p:nvPr>
+                <p:ph idx="1"/>
+              </p:nvPr>
+            </p:nvSpPr>
+            <p:spPr/>
+            <p:txBody>
+              <a:bodyPr/>
+              <a:lstStyle/>
+              <a:p>
+                <a14:m>
+                  <m:oMath xmlns:m="http://schemas.openxmlformats.org/officeDocument/2006/math">
+                    <m:r>
+                      <a:rPr lang="en-US" b="1" i="1" dirty="0" smtClean="0">
+                        <a:latin typeface="Cambria Math" panose="02040503050406030204" pitchFamily="18" charset="0"/>
+                      </a:rPr>
+                      <m:t>𝑳</m:t>
+                    </m:r>
+                    <m:r>
+                      <a:rPr lang="en-US" b="1" i="1" dirty="0" smtClean="0">
+                        <a:latin typeface="Cambria Math" panose="02040503050406030204" pitchFamily="18" charset="0"/>
+                      </a:rPr>
+                      <m:t>∈</m:t>
+                    </m:r>
+                    <m:r>
+                      <m:rPr>
+                        <m:lit/>
+                      </m:rPr>
+                      <a:rPr lang="en-US" b="1" i="1" dirty="0" smtClean="0">
+                        <a:latin typeface="Cambria Math" panose="02040503050406030204" pitchFamily="18" charset="0"/>
+                      </a:rPr>
+                      <m:t>{</m:t>
+                    </m:r>
+                    <m:r>
+                      <a:rPr lang="en-US" b="1" i="1" dirty="0" smtClean="0">
+                        <a:latin typeface="Cambria Math" panose="02040503050406030204" pitchFamily="18" charset="0"/>
+                      </a:rPr>
+                      <m:t>𝟏𝟎𝟎</m:t>
+                    </m:r>
+                    <m:r>
+                      <a:rPr lang="en-US" b="1" i="1" dirty="0" smtClean="0">
+                        <a:latin typeface="Cambria Math" panose="02040503050406030204" pitchFamily="18" charset="0"/>
+                      </a:rPr>
+                      <m:t>,</m:t>
+                    </m:r>
+                    <m:r>
+                      <a:rPr lang="en-US" b="1" i="1" dirty="0" smtClean="0">
+                        <a:latin typeface="Cambria Math" panose="02040503050406030204" pitchFamily="18" charset="0"/>
+                      </a:rPr>
+                      <m:t>𝟐𝟎𝟎</m:t>
+                    </m:r>
+                    <m:r>
+                      <a:rPr lang="en-US" b="1" i="1" dirty="0" smtClean="0">
+                        <a:latin typeface="Cambria Math" panose="02040503050406030204" pitchFamily="18" charset="0"/>
+                      </a:rPr>
+                      <m:t>,</m:t>
+                    </m:r>
+                    <m:r>
+                      <a:rPr lang="en-US" b="1" i="1" dirty="0" smtClean="0">
+                        <a:latin typeface="Cambria Math" panose="02040503050406030204" pitchFamily="18" charset="0"/>
+                      </a:rPr>
+                      <m:t>𝟑𝟎𝟎</m:t>
+                    </m:r>
+                    <m:r>
+                      <a:rPr lang="en-US" b="1" i="1" dirty="0" smtClean="0">
+                        <a:latin typeface="Cambria Math" panose="02040503050406030204" pitchFamily="18" charset="0"/>
+                      </a:rPr>
+                      <m:t>,…,</m:t>
+                    </m:r>
+                    <m:r>
+                      <a:rPr lang="en-US" b="1" i="1" dirty="0" smtClean="0">
+                        <a:latin typeface="Cambria Math" panose="02040503050406030204" pitchFamily="18" charset="0"/>
+                      </a:rPr>
+                      <m:t>𝟓𝟎𝟎</m:t>
+                    </m:r>
+                    <m:r>
+                      <m:rPr>
+                        <m:lit/>
+                      </m:rPr>
+                      <a:rPr lang="en-US" b="1" i="1" dirty="0" smtClean="0">
+                        <a:latin typeface="Cambria Math" panose="02040503050406030204" pitchFamily="18" charset="0"/>
+                      </a:rPr>
+                      <m:t>}</m:t>
+                    </m:r>
+                  </m:oMath>
+                </a14:m>
+                <a:endParaRPr lang="en-US" b="1" dirty="0"/>
+              </a:p>
+              <a:p>
+                <a14:m>
+                  <m:oMath xmlns:m="http://schemas.openxmlformats.org/officeDocument/2006/math">
+                    <m:r>
+                      <a:rPr lang="en-US" i="1" dirty="0" smtClean="0">
+                        <a:latin typeface="Cambria Math" panose="02040503050406030204" pitchFamily="18" charset="0"/>
+                      </a:rPr>
+                      <m:t>𝑐</m:t>
+                    </m:r>
+                    <m:r>
+                      <a:rPr lang="en-US" i="1" dirty="0" smtClean="0">
+                        <a:latin typeface="Cambria Math" panose="02040503050406030204" pitchFamily="18" charset="0"/>
+                      </a:rPr>
+                      <m:t>=16</m:t>
+                    </m:r>
+                  </m:oMath>
+                </a14:m>
+                <a:endParaRPr lang="en-US" dirty="0"/>
+              </a:p>
+              <a:p>
+                <a14:m>
+                  <m:oMath xmlns:m="http://schemas.openxmlformats.org/officeDocument/2006/math">
+                    <m:r>
+                      <a:rPr lang="en-US" i="1" dirty="0" smtClean="0">
+                        <a:latin typeface="Cambria Math" panose="02040503050406030204" pitchFamily="18" charset="0"/>
+                      </a:rPr>
+                      <m:t>𝑇</m:t>
+                    </m:r>
+                    <m:r>
+                      <a:rPr lang="en-US" i="1" dirty="0" smtClean="0">
+                        <a:latin typeface="Cambria Math" panose="02040503050406030204" pitchFamily="18" charset="0"/>
+                      </a:rPr>
+                      <m:t>=</m:t>
+                    </m:r>
+                    <m:r>
+                      <a:rPr lang="en-US" i="1" dirty="0" smtClean="0">
+                        <a:latin typeface="Cambria Math" panose="02040503050406030204" pitchFamily="18" charset="0"/>
+                      </a:rPr>
+                      <m:t>𝐿</m:t>
+                    </m:r>
+                  </m:oMath>
+                </a14:m>
+                <a:endParaRPr lang="en-US" dirty="0"/>
+              </a:p>
+              <a:p>
+                <a14:m>
+                  <m:oMath xmlns:m="http://schemas.openxmlformats.org/officeDocument/2006/math">
+                    <m:r>
+                      <a:rPr lang="en-US" b="1" i="1" dirty="0" smtClean="0">
+                        <a:latin typeface="Cambria Math" panose="02040503050406030204" pitchFamily="18" charset="0"/>
+                      </a:rPr>
+                      <m:t>𝒑</m:t>
+                    </m:r>
+                    <m:r>
+                      <a:rPr lang="en-US" b="1" i="1" dirty="0" smtClean="0">
+                        <a:latin typeface="Cambria Math" panose="02040503050406030204" pitchFamily="18" charset="0"/>
+                      </a:rPr>
+                      <m:t>∈{</m:t>
+                    </m:r>
+                    <m:r>
+                      <a:rPr lang="en-US" b="1" i="1" dirty="0" smtClean="0">
+                        <a:latin typeface="Cambria Math" panose="02040503050406030204" pitchFamily="18" charset="0"/>
+                      </a:rPr>
+                      <m:t>𝟎</m:t>
+                    </m:r>
+                    <m:r>
+                      <a:rPr lang="en-US" b="1" i="1" dirty="0" smtClean="0">
+                        <a:latin typeface="Cambria Math" panose="02040503050406030204" pitchFamily="18" charset="0"/>
+                      </a:rPr>
+                      <m:t>.</m:t>
+                    </m:r>
+                    <m:r>
+                      <a:rPr lang="en-US" b="1" i="1" dirty="0" smtClean="0">
+                        <a:latin typeface="Cambria Math" panose="02040503050406030204" pitchFamily="18" charset="0"/>
+                      </a:rPr>
+                      <m:t>𝟎𝟎𝟑𝟓</m:t>
+                    </m:r>
+                    <m:r>
+                      <a:rPr lang="en-US" b="1" i="1" dirty="0" smtClean="0">
+                        <a:latin typeface="Cambria Math" panose="02040503050406030204" pitchFamily="18" charset="0"/>
+                      </a:rPr>
+                      <m:t>,</m:t>
+                    </m:r>
+                    <m:r>
+                      <a:rPr lang="en-US" b="1" i="1" dirty="0" smtClean="0">
+                        <a:latin typeface="Cambria Math" panose="02040503050406030204" pitchFamily="18" charset="0"/>
+                      </a:rPr>
+                      <m:t>𝟎</m:t>
+                    </m:r>
+                    <m:r>
+                      <a:rPr lang="en-US" b="1" i="1" dirty="0" smtClean="0">
+                        <a:latin typeface="Cambria Math" panose="02040503050406030204" pitchFamily="18" charset="0"/>
+                      </a:rPr>
+                      <m:t>.</m:t>
+                    </m:r>
+                    <m:r>
+                      <a:rPr lang="en-US" b="1" i="1" dirty="0" smtClean="0">
+                        <a:latin typeface="Cambria Math" panose="02040503050406030204" pitchFamily="18" charset="0"/>
+                      </a:rPr>
+                      <m:t>𝟎𝟎𝟑𝟔</m:t>
+                    </m:r>
+                    <m:r>
+                      <a:rPr lang="en-US" b="1" i="1" dirty="0" smtClean="0">
+                        <a:latin typeface="Cambria Math" panose="02040503050406030204" pitchFamily="18" charset="0"/>
+                      </a:rPr>
+                      <m:t>,</m:t>
+                    </m:r>
+                    <m:r>
+                      <a:rPr lang="en-US" b="1" i="1" dirty="0" smtClean="0">
+                        <a:latin typeface="Cambria Math" panose="02040503050406030204" pitchFamily="18" charset="0"/>
+                      </a:rPr>
+                      <m:t>𝟎</m:t>
+                    </m:r>
+                    <m:r>
+                      <a:rPr lang="en-US" b="1" i="1" dirty="0" smtClean="0">
+                        <a:latin typeface="Cambria Math" panose="02040503050406030204" pitchFamily="18" charset="0"/>
+                      </a:rPr>
+                      <m:t>.</m:t>
+                    </m:r>
+                    <m:r>
+                      <a:rPr lang="en-US" b="1" i="1" dirty="0" smtClean="0">
+                        <a:latin typeface="Cambria Math" panose="02040503050406030204" pitchFamily="18" charset="0"/>
+                      </a:rPr>
+                      <m:t>𝟎𝟎𝟑𝟕</m:t>
+                    </m:r>
+                    <m:r>
+                      <a:rPr lang="en-US" b="1" i="1" dirty="0" smtClean="0">
+                        <a:latin typeface="Cambria Math" panose="02040503050406030204" pitchFamily="18" charset="0"/>
+                      </a:rPr>
+                      <m:t>,…,</m:t>
+                    </m:r>
+                    <m:r>
+                      <a:rPr lang="en-US" b="1" i="1" dirty="0" smtClean="0">
+                        <a:latin typeface="Cambria Math" panose="02040503050406030204" pitchFamily="18" charset="0"/>
+                      </a:rPr>
+                      <m:t>𝟎</m:t>
+                    </m:r>
+                    <m:r>
+                      <a:rPr lang="en-US" b="1" i="1" dirty="0" smtClean="0">
+                        <a:latin typeface="Cambria Math" panose="02040503050406030204" pitchFamily="18" charset="0"/>
+                      </a:rPr>
+                      <m:t>.</m:t>
+                    </m:r>
+                    <m:r>
+                      <a:rPr lang="en-US" b="1" i="1" dirty="0" smtClean="0">
+                        <a:latin typeface="Cambria Math" panose="02040503050406030204" pitchFamily="18" charset="0"/>
+                      </a:rPr>
+                      <m:t>𝟎𝟎𝟒𝟓</m:t>
+                    </m:r>
+                    <m:r>
+                      <m:rPr>
+                        <m:lit/>
+                      </m:rPr>
+                      <a:rPr lang="en-US" b="1" i="1" dirty="0" smtClean="0">
+                        <a:latin typeface="Cambria Math" panose="02040503050406030204" pitchFamily="18" charset="0"/>
+                      </a:rPr>
+                      <m:t>}</m:t>
+                    </m:r>
+                  </m:oMath>
+                </a14:m>
+                <a:endParaRPr lang="en-US" b="1" dirty="0"/>
+              </a:p>
+              <a:p>
+                <a14:m>
+                  <m:oMath xmlns:m="http://schemas.openxmlformats.org/officeDocument/2006/math">
+                    <m:r>
+                      <a:rPr lang="en-US" i="1" dirty="0" smtClean="0">
+                        <a:latin typeface="Cambria Math" panose="02040503050406030204" pitchFamily="18" charset="0"/>
+                      </a:rPr>
+                      <m:t>𝜂</m:t>
+                    </m:r>
+                    <m:r>
+                      <a:rPr lang="en-US" i="1" dirty="0" smtClean="0">
+                        <a:latin typeface="Cambria Math" panose="02040503050406030204" pitchFamily="18" charset="0"/>
+                      </a:rPr>
+                      <m:t>=0.1</m:t>
+                    </m:r>
+                  </m:oMath>
+                </a14:m>
+                <a:endParaRPr lang="en-US" dirty="0"/>
+              </a:p>
+              <a:p>
+                <a:r>
+                  <a:rPr lang="en-US" dirty="0"/>
+                  <a:t>12 hours, 1 GPU / task</a:t>
+                </a:r>
+              </a:p>
+            </p:txBody>
+          </p:sp>
+        </mc:Choice>
+        <mc:Fallback>
+          <p:sp>
+            <p:nvSpPr>
+              <p:cNvPr id="3" name="Content Placeholder 2">
+                <a:extLst>
+                  <a:ext uri="{FF2B5EF4-FFF2-40B4-BE49-F238E27FC236}">
+                    <a16:creationId xmlns:a16="http://schemas.microsoft.com/office/drawing/2014/main" id="{F567ADB7-F744-B166-BEF6-BB2549F8A4D4}"/>
+                  </a:ext>
+                </a:extLst>
+              </p:cNvPr>
+              <p:cNvSpPr>
+                <a:spLocks noGrp="1" noRot="1" noChangeAspect="1" noMove="1" noResize="1" noEditPoints="1" noAdjustHandles="1" noChangeArrowheads="1" noChangeShapeType="1" noTextEdit="1"/>
+              </p:cNvSpPr>
+              <p:nvPr>
+                <p:ph idx="1"/>
+              </p:nvPr>
+            </p:nvSpPr>
+            <p:spPr>
+              <a:blipFill>
+                <a:blip r:embed="rId2"/>
+                <a:stretch>
+                  <a:fillRect l="-1043"/>
+                </a:stretch>
+              </a:blipFill>
+            </p:spPr>
+            <p:txBody>
+              <a:bodyPr/>
+              <a:lstStyle/>
+              <a:p>
+                <a:r>
+                  <a:rPr lang="en-US">
+                    <a:noFill/>
+                  </a:rPr>
+                  <a:t> </a:t>
+                </a:r>
+              </a:p>
+            </p:txBody>
+          </p:sp>
+        </mc:Fallback>
+      </mc:AlternateContent>
+    </p:spTree>
+    <p:extLst>
+      <p:ext uri="{BB962C8B-B14F-4D97-AF65-F5344CB8AC3E}">
+        <p14:creationId xmlns:p14="http://schemas.microsoft.com/office/powerpoint/2010/main" val="2481858239"/>
       </p:ext>
     </p:extLst>
   </p:cSld>

</xml_diff>

<commit_message>
make plots; tweak time limit
</commit_message>
<xml_diff>
--- a/plots/Plots.pptx
+++ b/plots/Plots.pptx
@@ -42,6 +42,8 @@
     <p:sldId id="291" r:id="rId36"/>
     <p:sldId id="293" r:id="rId37"/>
     <p:sldId id="292" r:id="rId38"/>
+    <p:sldId id="294" r:id="rId39"/>
+    <p:sldId id="295" r:id="rId40"/>
   </p:sldIdLst>
   <p:sldSz cx="12192000" cy="6858000"/>
   <p:notesSz cx="6858000" cy="9144000"/>
@@ -295,7 +297,7 @@
           <a:p>
             <a:fld id="{E4B0A79A-3997-4F54-9D51-15EE0C15CBF2}" type="datetimeFigureOut">
               <a:rPr lang="en-US" smtClean="0"/>
-              <a:t>2024-08-29</a:t>
+              <a:t>2024-08-30</a:t>
             </a:fld>
             <a:endParaRPr lang="en-US"/>
           </a:p>
@@ -493,7 +495,7 @@
           <a:p>
             <a:fld id="{E4B0A79A-3997-4F54-9D51-15EE0C15CBF2}" type="datetimeFigureOut">
               <a:rPr lang="en-US" smtClean="0"/>
-              <a:t>2024-08-29</a:t>
+              <a:t>2024-08-30</a:t>
             </a:fld>
             <a:endParaRPr lang="en-US"/>
           </a:p>
@@ -701,7 +703,7 @@
           <a:p>
             <a:fld id="{E4B0A79A-3997-4F54-9D51-15EE0C15CBF2}" type="datetimeFigureOut">
               <a:rPr lang="en-US" smtClean="0"/>
-              <a:t>2024-08-29</a:t>
+              <a:t>2024-08-30</a:t>
             </a:fld>
             <a:endParaRPr lang="en-US"/>
           </a:p>
@@ -899,7 +901,7 @@
           <a:p>
             <a:fld id="{E4B0A79A-3997-4F54-9D51-15EE0C15CBF2}" type="datetimeFigureOut">
               <a:rPr lang="en-US" smtClean="0"/>
-              <a:t>2024-08-29</a:t>
+              <a:t>2024-08-30</a:t>
             </a:fld>
             <a:endParaRPr lang="en-US"/>
           </a:p>
@@ -1174,7 +1176,7 @@
           <a:p>
             <a:fld id="{E4B0A79A-3997-4F54-9D51-15EE0C15CBF2}" type="datetimeFigureOut">
               <a:rPr lang="en-US" smtClean="0"/>
-              <a:t>2024-08-29</a:t>
+              <a:t>2024-08-30</a:t>
             </a:fld>
             <a:endParaRPr lang="en-US"/>
           </a:p>
@@ -1439,7 +1441,7 @@
           <a:p>
             <a:fld id="{E4B0A79A-3997-4F54-9D51-15EE0C15CBF2}" type="datetimeFigureOut">
               <a:rPr lang="en-US" smtClean="0"/>
-              <a:t>2024-08-29</a:t>
+              <a:t>2024-08-30</a:t>
             </a:fld>
             <a:endParaRPr lang="en-US"/>
           </a:p>
@@ -1851,7 +1853,7 @@
           <a:p>
             <a:fld id="{E4B0A79A-3997-4F54-9D51-15EE0C15CBF2}" type="datetimeFigureOut">
               <a:rPr lang="en-US" smtClean="0"/>
-              <a:t>2024-08-29</a:t>
+              <a:t>2024-08-30</a:t>
             </a:fld>
             <a:endParaRPr lang="en-US"/>
           </a:p>
@@ -1992,7 +1994,7 @@
           <a:p>
             <a:fld id="{E4B0A79A-3997-4F54-9D51-15EE0C15CBF2}" type="datetimeFigureOut">
               <a:rPr lang="en-US" smtClean="0"/>
-              <a:t>2024-08-29</a:t>
+              <a:t>2024-08-30</a:t>
             </a:fld>
             <a:endParaRPr lang="en-US"/>
           </a:p>
@@ -2105,7 +2107,7 @@
           <a:p>
             <a:fld id="{E4B0A79A-3997-4F54-9D51-15EE0C15CBF2}" type="datetimeFigureOut">
               <a:rPr lang="en-US" smtClean="0"/>
-              <a:t>2024-08-29</a:t>
+              <a:t>2024-08-30</a:t>
             </a:fld>
             <a:endParaRPr lang="en-US"/>
           </a:p>
@@ -2416,7 +2418,7 @@
           <a:p>
             <a:fld id="{E4B0A79A-3997-4F54-9D51-15EE0C15CBF2}" type="datetimeFigureOut">
               <a:rPr lang="en-US" smtClean="0"/>
-              <a:t>2024-08-29</a:t>
+              <a:t>2024-08-30</a:t>
             </a:fld>
             <a:endParaRPr lang="en-US"/>
           </a:p>
@@ -2704,7 +2706,7 @@
           <a:p>
             <a:fld id="{E4B0A79A-3997-4F54-9D51-15EE0C15CBF2}" type="datetimeFigureOut">
               <a:rPr lang="en-US" smtClean="0"/>
-              <a:t>2024-08-29</a:t>
+              <a:t>2024-08-30</a:t>
             </a:fld>
             <a:endParaRPr lang="en-US"/>
           </a:p>
@@ -2945,7 +2947,7 @@
           <a:p>
             <a:fld id="{E4B0A79A-3997-4F54-9D51-15EE0C15CBF2}" type="datetimeFigureOut">
               <a:rPr lang="en-US" smtClean="0"/>
-              <a:t>2024-08-29</a:t>
+              <a:t>2024-08-30</a:t>
             </a:fld>
             <a:endParaRPr lang="en-US"/>
           </a:p>
@@ -10113,8 +10115,8 @@
           </a:p>
         </p:txBody>
       </p:sp>
-      <mc:AlternateContent xmlns:mc="http://schemas.openxmlformats.org/markup-compatibility/2006">
-        <mc:Choice xmlns:a14="http://schemas.microsoft.com/office/drawing/2010/main" Requires="a14">
+      <mc:AlternateContent xmlns:mc="http://schemas.openxmlformats.org/markup-compatibility/2006" xmlns:a14="http://schemas.microsoft.com/office/drawing/2010/main">
+        <mc:Choice Requires="a14">
           <p:sp>
             <p:nvSpPr>
               <p:cNvPr id="3" name="Content Placeholder 2">
@@ -10323,7 +10325,7 @@
             </p:txBody>
           </p:sp>
         </mc:Choice>
-        <mc:Fallback>
+        <mc:Fallback xmlns="">
           <p:sp>
             <p:nvSpPr>
               <p:cNvPr id="3" name="Content Placeholder 2">
@@ -10550,8 +10552,8 @@
           </a:p>
         </p:txBody>
       </p:sp>
-      <mc:AlternateContent xmlns:mc="http://schemas.openxmlformats.org/markup-compatibility/2006">
-        <mc:Choice xmlns:a14="http://schemas.microsoft.com/office/drawing/2010/main" Requires="a14">
+      <mc:AlternateContent xmlns:mc="http://schemas.openxmlformats.org/markup-compatibility/2006" xmlns:a14="http://schemas.microsoft.com/office/drawing/2010/main">
+        <mc:Choice Requires="a14">
           <p:sp>
             <p:nvSpPr>
               <p:cNvPr id="3" name="Content Placeholder 2">
@@ -10841,7 +10843,7 @@
             </p:txBody>
           </p:sp>
         </mc:Choice>
-        <mc:Fallback>
+        <mc:Fallback xmlns="">
           <p:sp>
             <p:nvSpPr>
               <p:cNvPr id="3" name="Content Placeholder 2">
@@ -10885,6 +10887,228 @@
     <p:extLst>
       <p:ext uri="{BB962C8B-B14F-4D97-AF65-F5344CB8AC3E}">
         <p14:creationId xmlns:p14="http://schemas.microsoft.com/office/powerpoint/2010/main" val="2481858239"/>
+      </p:ext>
+    </p:extLst>
+  </p:cSld>
+  <p:clrMapOvr>
+    <a:masterClrMapping/>
+  </p:clrMapOvr>
+</p:sld>
+</file>
+
+<file path=ppt/slides/slide38.xml><?xml version="1.0" encoding="utf-8"?>
+<p:sld xmlns:a="http://schemas.openxmlformats.org/drawingml/2006/main" xmlns:r="http://schemas.openxmlformats.org/officeDocument/2006/relationships" xmlns:p="http://schemas.openxmlformats.org/presentationml/2006/main">
+  <p:cSld>
+    <p:spTree>
+      <p:nvGrpSpPr>
+        <p:cNvPr id="1" name=""/>
+        <p:cNvGrpSpPr/>
+        <p:nvPr/>
+      </p:nvGrpSpPr>
+      <p:grpSpPr>
+        <a:xfrm>
+          <a:off x="0" y="0"/>
+          <a:ext cx="0" cy="0"/>
+          <a:chOff x="0" y="0"/>
+          <a:chExt cx="0" cy="0"/>
+        </a:xfrm>
+      </p:grpSpPr>
+      <p:sp>
+        <p:nvSpPr>
+          <p:cNvPr id="2" name="Title 1">
+            <a:extLst>
+              <a:ext uri="{FF2B5EF4-FFF2-40B4-BE49-F238E27FC236}">
+                <a16:creationId xmlns:a16="http://schemas.microsoft.com/office/drawing/2014/main" id="{4CE77D96-7A9E-0D82-6001-4C7F5A63E9E5}"/>
+              </a:ext>
+            </a:extLst>
+          </p:cNvPr>
+          <p:cNvSpPr>
+            <a:spLocks noGrp="1"/>
+          </p:cNvSpPr>
+          <p:nvPr>
+            <p:ph type="title"/>
+          </p:nvPr>
+        </p:nvSpPr>
+        <p:spPr/>
+        <p:txBody>
+          <a:bodyPr/>
+          <a:lstStyle/>
+          <a:p>
+            <a:r>
+              <a:rPr lang="en-US" dirty="0"/>
+              <a:t>Run 12</a:t>
+            </a:r>
+          </a:p>
+        </p:txBody>
+      </p:sp>
+      <p:pic>
+        <p:nvPicPr>
+          <p:cNvPr id="5" name="Content Placeholder 4" descr="A screenshot of a computer&#10;&#10;Description automatically generated">
+            <a:extLst>
+              <a:ext uri="{FF2B5EF4-FFF2-40B4-BE49-F238E27FC236}">
+                <a16:creationId xmlns:a16="http://schemas.microsoft.com/office/drawing/2014/main" id="{3BBCFF1D-15EF-B3A9-EE3D-5A4BEE5331EA}"/>
+              </a:ext>
+            </a:extLst>
+          </p:cNvPr>
+          <p:cNvPicPr>
+            <a:picLocks noGrp="1" noChangeAspect="1"/>
+          </p:cNvPicPr>
+          <p:nvPr>
+            <p:ph idx="1"/>
+          </p:nvPr>
+        </p:nvPicPr>
+        <p:blipFill>
+          <a:blip r:embed="rId2">
+            <a:extLst>
+              <a:ext uri="{28A0092B-C50C-407E-A947-70E740481C1C}">
+                <a14:useLocalDpi xmlns:a14="http://schemas.microsoft.com/office/drawing/2010/main" val="0"/>
+              </a:ext>
+            </a:extLst>
+          </a:blip>
+          <a:stretch>
+            <a:fillRect/>
+          </a:stretch>
+        </p:blipFill>
+        <p:spPr>
+          <a:xfrm>
+            <a:off x="0" y="1098248"/>
+            <a:ext cx="12186432" cy="5686010"/>
+          </a:xfrm>
+        </p:spPr>
+      </p:pic>
+    </p:spTree>
+    <p:extLst>
+      <p:ext uri="{BB962C8B-B14F-4D97-AF65-F5344CB8AC3E}">
+        <p14:creationId xmlns:p14="http://schemas.microsoft.com/office/powerpoint/2010/main" val="2271009722"/>
+      </p:ext>
+    </p:extLst>
+  </p:cSld>
+  <p:clrMapOvr>
+    <a:masterClrMapping/>
+  </p:clrMapOvr>
+</p:sld>
+</file>
+
+<file path=ppt/slides/slide39.xml><?xml version="1.0" encoding="utf-8"?>
+<p:sld xmlns:a="http://schemas.openxmlformats.org/drawingml/2006/main" xmlns:r="http://schemas.openxmlformats.org/officeDocument/2006/relationships" xmlns:p="http://schemas.openxmlformats.org/presentationml/2006/main">
+  <p:cSld>
+    <p:spTree>
+      <p:nvGrpSpPr>
+        <p:cNvPr id="1" name=""/>
+        <p:cNvGrpSpPr/>
+        <p:nvPr/>
+      </p:nvGrpSpPr>
+      <p:grpSpPr>
+        <a:xfrm>
+          <a:off x="0" y="0"/>
+          <a:ext cx="0" cy="0"/>
+          <a:chOff x="0" y="0"/>
+          <a:chExt cx="0" cy="0"/>
+        </a:xfrm>
+      </p:grpSpPr>
+      <p:sp>
+        <p:nvSpPr>
+          <p:cNvPr id="2" name="Title 1">
+            <a:extLst>
+              <a:ext uri="{FF2B5EF4-FFF2-40B4-BE49-F238E27FC236}">
+                <a16:creationId xmlns:a16="http://schemas.microsoft.com/office/drawing/2014/main" id="{CEA9BCDC-88ED-9064-00E5-53F40BD6DC8E}"/>
+              </a:ext>
+            </a:extLst>
+          </p:cNvPr>
+          <p:cNvSpPr>
+            <a:spLocks noGrp="1"/>
+          </p:cNvSpPr>
+          <p:nvPr>
+            <p:ph type="title"/>
+          </p:nvPr>
+        </p:nvSpPr>
+        <p:spPr/>
+        <p:txBody>
+          <a:bodyPr/>
+          <a:lstStyle/>
+          <a:p>
+            <a:r>
+              <a:rPr lang="en-US" dirty="0"/>
+              <a:t>Run 12</a:t>
+            </a:r>
+          </a:p>
+        </p:txBody>
+      </p:sp>
+      <p:pic>
+        <p:nvPicPr>
+          <p:cNvPr id="5" name="Content Placeholder 4" descr="A graph of different colored lines&#10;&#10;Description automatically generated">
+            <a:extLst>
+              <a:ext uri="{FF2B5EF4-FFF2-40B4-BE49-F238E27FC236}">
+                <a16:creationId xmlns:a16="http://schemas.microsoft.com/office/drawing/2014/main" id="{55D56776-CCC2-5E42-83D3-304E82BAB742}"/>
+              </a:ext>
+            </a:extLst>
+          </p:cNvPr>
+          <p:cNvPicPr>
+            <a:picLocks noGrp="1" noChangeAspect="1"/>
+          </p:cNvPicPr>
+          <p:nvPr>
+            <p:ph idx="1"/>
+          </p:nvPr>
+        </p:nvPicPr>
+        <p:blipFill>
+          <a:blip r:embed="rId2">
+            <a:extLst>
+              <a:ext uri="{28A0092B-C50C-407E-A947-70E740481C1C}">
+                <a14:useLocalDpi xmlns:a14="http://schemas.microsoft.com/office/drawing/2010/main" val="0"/>
+              </a:ext>
+            </a:extLst>
+          </a:blip>
+          <a:stretch>
+            <a:fillRect/>
+          </a:stretch>
+        </p:blipFill>
+        <p:spPr>
+          <a:xfrm>
+            <a:off x="6096000" y="1604061"/>
+            <a:ext cx="6081623" cy="4654670"/>
+          </a:xfrm>
+        </p:spPr>
+      </p:pic>
+      <p:pic>
+        <p:nvPicPr>
+          <p:cNvPr id="7" name="Picture 6" descr="A graph on a black background&#10;&#10;Description automatically generated">
+            <a:extLst>
+              <a:ext uri="{FF2B5EF4-FFF2-40B4-BE49-F238E27FC236}">
+                <a16:creationId xmlns:a16="http://schemas.microsoft.com/office/drawing/2014/main" id="{DBDC7198-E0F9-B9EB-E402-13469977FA32}"/>
+              </a:ext>
+            </a:extLst>
+          </p:cNvPr>
+          <p:cNvPicPr>
+            <a:picLocks noChangeAspect="1"/>
+          </p:cNvPicPr>
+          <p:nvPr/>
+        </p:nvPicPr>
+        <p:blipFill>
+          <a:blip r:embed="rId3">
+            <a:extLst>
+              <a:ext uri="{28A0092B-C50C-407E-A947-70E740481C1C}">
+                <a14:useLocalDpi xmlns:a14="http://schemas.microsoft.com/office/drawing/2010/main" val="0"/>
+              </a:ext>
+            </a:extLst>
+          </a:blip>
+          <a:stretch>
+            <a:fillRect/>
+          </a:stretch>
+        </p:blipFill>
+        <p:spPr>
+          <a:xfrm>
+            <a:off x="0" y="1604061"/>
+            <a:ext cx="6096000" cy="4654670"/>
+          </a:xfrm>
+          <a:prstGeom prst="rect">
+            <a:avLst/>
+          </a:prstGeom>
+        </p:spPr>
+      </p:pic>
+    </p:spTree>
+    <p:extLst>
+      <p:ext uri="{BB962C8B-B14F-4D97-AF65-F5344CB8AC3E}">
+        <p14:creationId xmlns:p14="http://schemas.microsoft.com/office/powerpoint/2010/main" val="4285886293"/>
       </p:ext>
     </p:extLst>
   </p:cSld>

</xml_diff>

<commit_message>
make plots for run 13
</commit_message>
<xml_diff>
--- a/plots/Plots.pptx
+++ b/plots/Plots.pptx
@@ -45,6 +45,9 @@
     <p:sldId id="294" r:id="rId39"/>
     <p:sldId id="295" r:id="rId40"/>
     <p:sldId id="296" r:id="rId41"/>
+    <p:sldId id="297" r:id="rId42"/>
+    <p:sldId id="298" r:id="rId43"/>
+    <p:sldId id="299" r:id="rId44"/>
   </p:sldIdLst>
   <p:sldSz cx="12192000" cy="6858000"/>
   <p:notesSz cx="6858000" cy="9144000"/>
@@ -298,7 +301,7 @@
           <a:p>
             <a:fld id="{E4B0A79A-3997-4F54-9D51-15EE0C15CBF2}" type="datetimeFigureOut">
               <a:rPr lang="en-US" smtClean="0"/>
-              <a:t>2024-08-30</a:t>
+              <a:t>2024-09-02</a:t>
             </a:fld>
             <a:endParaRPr lang="en-US"/>
           </a:p>
@@ -496,7 +499,7 @@
           <a:p>
             <a:fld id="{E4B0A79A-3997-4F54-9D51-15EE0C15CBF2}" type="datetimeFigureOut">
               <a:rPr lang="en-US" smtClean="0"/>
-              <a:t>2024-08-30</a:t>
+              <a:t>2024-09-02</a:t>
             </a:fld>
             <a:endParaRPr lang="en-US"/>
           </a:p>
@@ -704,7 +707,7 @@
           <a:p>
             <a:fld id="{E4B0A79A-3997-4F54-9D51-15EE0C15CBF2}" type="datetimeFigureOut">
               <a:rPr lang="en-US" smtClean="0"/>
-              <a:t>2024-08-30</a:t>
+              <a:t>2024-09-02</a:t>
             </a:fld>
             <a:endParaRPr lang="en-US"/>
           </a:p>
@@ -902,7 +905,7 @@
           <a:p>
             <a:fld id="{E4B0A79A-3997-4F54-9D51-15EE0C15CBF2}" type="datetimeFigureOut">
               <a:rPr lang="en-US" smtClean="0"/>
-              <a:t>2024-08-30</a:t>
+              <a:t>2024-09-02</a:t>
             </a:fld>
             <a:endParaRPr lang="en-US"/>
           </a:p>
@@ -1177,7 +1180,7 @@
           <a:p>
             <a:fld id="{E4B0A79A-3997-4F54-9D51-15EE0C15CBF2}" type="datetimeFigureOut">
               <a:rPr lang="en-US" smtClean="0"/>
-              <a:t>2024-08-30</a:t>
+              <a:t>2024-09-02</a:t>
             </a:fld>
             <a:endParaRPr lang="en-US"/>
           </a:p>
@@ -1442,7 +1445,7 @@
           <a:p>
             <a:fld id="{E4B0A79A-3997-4F54-9D51-15EE0C15CBF2}" type="datetimeFigureOut">
               <a:rPr lang="en-US" smtClean="0"/>
-              <a:t>2024-08-30</a:t>
+              <a:t>2024-09-02</a:t>
             </a:fld>
             <a:endParaRPr lang="en-US"/>
           </a:p>
@@ -1854,7 +1857,7 @@
           <a:p>
             <a:fld id="{E4B0A79A-3997-4F54-9D51-15EE0C15CBF2}" type="datetimeFigureOut">
               <a:rPr lang="en-US" smtClean="0"/>
-              <a:t>2024-08-30</a:t>
+              <a:t>2024-09-02</a:t>
             </a:fld>
             <a:endParaRPr lang="en-US"/>
           </a:p>
@@ -1995,7 +1998,7 @@
           <a:p>
             <a:fld id="{E4B0A79A-3997-4F54-9D51-15EE0C15CBF2}" type="datetimeFigureOut">
               <a:rPr lang="en-US" smtClean="0"/>
-              <a:t>2024-08-30</a:t>
+              <a:t>2024-09-02</a:t>
             </a:fld>
             <a:endParaRPr lang="en-US"/>
           </a:p>
@@ -2108,7 +2111,7 @@
           <a:p>
             <a:fld id="{E4B0A79A-3997-4F54-9D51-15EE0C15CBF2}" type="datetimeFigureOut">
               <a:rPr lang="en-US" smtClean="0"/>
-              <a:t>2024-08-30</a:t>
+              <a:t>2024-09-02</a:t>
             </a:fld>
             <a:endParaRPr lang="en-US"/>
           </a:p>
@@ -2419,7 +2422,7 @@
           <a:p>
             <a:fld id="{E4B0A79A-3997-4F54-9D51-15EE0C15CBF2}" type="datetimeFigureOut">
               <a:rPr lang="en-US" smtClean="0"/>
-              <a:t>2024-08-30</a:t>
+              <a:t>2024-09-02</a:t>
             </a:fld>
             <a:endParaRPr lang="en-US"/>
           </a:p>
@@ -2707,7 +2710,7 @@
           <a:p>
             <a:fld id="{E4B0A79A-3997-4F54-9D51-15EE0C15CBF2}" type="datetimeFigureOut">
               <a:rPr lang="en-US" smtClean="0"/>
-              <a:t>2024-08-30</a:t>
+              <a:t>2024-09-02</a:t>
             </a:fld>
             <a:endParaRPr lang="en-US"/>
           </a:p>
@@ -2948,7 +2951,7 @@
           <a:p>
             <a:fld id="{E4B0A79A-3997-4F54-9D51-15EE0C15CBF2}" type="datetimeFigureOut">
               <a:rPr lang="en-US" smtClean="0"/>
-              <a:t>2024-08-30</a:t>
+              <a:t>2024-09-02</a:t>
             </a:fld>
             <a:endParaRPr lang="en-US"/>
           </a:p>
@@ -11377,6 +11380,617 @@
 </p:sld>
 </file>
 
+<file path=ppt/slides/slide41.xml><?xml version="1.0" encoding="utf-8"?>
+<p:sld xmlns:a="http://schemas.openxmlformats.org/drawingml/2006/main" xmlns:r="http://schemas.openxmlformats.org/officeDocument/2006/relationships" xmlns:p="http://schemas.openxmlformats.org/presentationml/2006/main">
+  <p:cSld>
+    <p:spTree>
+      <p:nvGrpSpPr>
+        <p:cNvPr id="1" name=""/>
+        <p:cNvGrpSpPr/>
+        <p:nvPr/>
+      </p:nvGrpSpPr>
+      <p:grpSpPr>
+        <a:xfrm>
+          <a:off x="0" y="0"/>
+          <a:ext cx="0" cy="0"/>
+          <a:chOff x="0" y="0"/>
+          <a:chExt cx="0" cy="0"/>
+        </a:xfrm>
+      </p:grpSpPr>
+      <p:sp>
+        <p:nvSpPr>
+          <p:cNvPr id="2" name="Title 1">
+            <a:extLst>
+              <a:ext uri="{FF2B5EF4-FFF2-40B4-BE49-F238E27FC236}">
+                <a16:creationId xmlns:a16="http://schemas.microsoft.com/office/drawing/2014/main" id="{B797A52D-8C56-4CC5-48D0-88D222D029E4}"/>
+              </a:ext>
+            </a:extLst>
+          </p:cNvPr>
+          <p:cNvSpPr>
+            <a:spLocks noGrp="1"/>
+          </p:cNvSpPr>
+          <p:nvPr>
+            <p:ph type="title"/>
+          </p:nvPr>
+        </p:nvSpPr>
+        <p:spPr/>
+        <p:txBody>
+          <a:bodyPr/>
+          <a:lstStyle/>
+          <a:p>
+            <a:r>
+              <a:rPr lang="en-US" dirty="0"/>
+              <a:t>Run 13</a:t>
+            </a:r>
+          </a:p>
+        </p:txBody>
+      </p:sp>
+      <mc:AlternateContent xmlns:mc="http://schemas.openxmlformats.org/markup-compatibility/2006">
+        <mc:Choice xmlns:a14="http://schemas.microsoft.com/office/drawing/2010/main" Requires="a14">
+          <p:sp>
+            <p:nvSpPr>
+              <p:cNvPr id="3" name="Content Placeholder 2">
+                <a:extLst>
+                  <a:ext uri="{FF2B5EF4-FFF2-40B4-BE49-F238E27FC236}">
+                    <a16:creationId xmlns:a16="http://schemas.microsoft.com/office/drawing/2014/main" id="{F567ADB7-F744-B166-BEF6-BB2549F8A4D4}"/>
+                  </a:ext>
+                </a:extLst>
+              </p:cNvPr>
+              <p:cNvSpPr>
+                <a:spLocks noGrp="1"/>
+              </p:cNvSpPr>
+              <p:nvPr>
+                <p:ph idx="1"/>
+              </p:nvPr>
+            </p:nvSpPr>
+            <p:spPr/>
+            <p:txBody>
+              <a:bodyPr/>
+              <a:lstStyle/>
+              <a:p>
+                <a14:m>
+                  <m:oMath xmlns:m="http://schemas.openxmlformats.org/officeDocument/2006/math">
+                    <m:r>
+                      <a:rPr lang="en-US" b="1" i="1" dirty="0" smtClean="0">
+                        <a:latin typeface="Cambria Math" panose="02040503050406030204" pitchFamily="18" charset="0"/>
+                      </a:rPr>
+                      <m:t>𝑳</m:t>
+                    </m:r>
+                    <m:r>
+                      <a:rPr lang="en-US" b="1" i="1" dirty="0" smtClean="0">
+                        <a:latin typeface="Cambria Math" panose="02040503050406030204" pitchFamily="18" charset="0"/>
+                      </a:rPr>
+                      <m:t>∈</m:t>
+                    </m:r>
+                    <m:r>
+                      <m:rPr>
+                        <m:lit/>
+                      </m:rPr>
+                      <a:rPr lang="en-US" b="1" i="1" dirty="0" smtClean="0">
+                        <a:latin typeface="Cambria Math" panose="02040503050406030204" pitchFamily="18" charset="0"/>
+                      </a:rPr>
+                      <m:t>{</m:t>
+                    </m:r>
+                    <m:r>
+                      <a:rPr lang="en-US" b="1" i="1" dirty="0" smtClean="0">
+                        <a:latin typeface="Cambria Math" panose="02040503050406030204" pitchFamily="18" charset="0"/>
+                      </a:rPr>
+                      <m:t>𝟓𝟎</m:t>
+                    </m:r>
+                    <m:r>
+                      <a:rPr lang="en-US" b="1" i="1" dirty="0" smtClean="0">
+                        <a:latin typeface="Cambria Math" panose="02040503050406030204" pitchFamily="18" charset="0"/>
+                      </a:rPr>
+                      <m:t>, </m:t>
+                    </m:r>
+                    <m:r>
+                      <a:rPr lang="en-US" b="1" i="1" dirty="0" smtClean="0">
+                        <a:latin typeface="Cambria Math" panose="02040503050406030204" pitchFamily="18" charset="0"/>
+                      </a:rPr>
+                      <m:t>𝟏𝟎𝟎</m:t>
+                    </m:r>
+                    <m:r>
+                      <a:rPr lang="en-US" b="1" i="1" dirty="0" smtClean="0">
+                        <a:latin typeface="Cambria Math" panose="02040503050406030204" pitchFamily="18" charset="0"/>
+                      </a:rPr>
+                      <m:t>, </m:t>
+                    </m:r>
+                    <m:r>
+                      <a:rPr lang="en-US" b="1" i="1" dirty="0" smtClean="0">
+                        <a:latin typeface="Cambria Math" panose="02040503050406030204" pitchFamily="18" charset="0"/>
+                      </a:rPr>
+                      <m:t>𝟏𝟓𝟎</m:t>
+                    </m:r>
+                    <m:r>
+                      <a:rPr lang="en-US" b="1" i="1" dirty="0" smtClean="0">
+                        <a:latin typeface="Cambria Math" panose="02040503050406030204" pitchFamily="18" charset="0"/>
+                      </a:rPr>
+                      <m:t>, …, </m:t>
+                    </m:r>
+                    <m:r>
+                      <a:rPr lang="en-US" b="1" i="1" dirty="0" smtClean="0">
+                        <a:latin typeface="Cambria Math" panose="02040503050406030204" pitchFamily="18" charset="0"/>
+                      </a:rPr>
+                      <m:t>𝟐𝟓𝟎</m:t>
+                    </m:r>
+                    <m:r>
+                      <m:rPr>
+                        <m:lit/>
+                      </m:rPr>
+                      <a:rPr lang="en-US" b="1" i="1" dirty="0" smtClean="0">
+                        <a:latin typeface="Cambria Math" panose="02040503050406030204" pitchFamily="18" charset="0"/>
+                      </a:rPr>
+                      <m:t>}</m:t>
+                    </m:r>
+                  </m:oMath>
+                </a14:m>
+                <a:endParaRPr lang="en-US" b="1" dirty="0"/>
+              </a:p>
+              <a:p>
+                <a14:m>
+                  <m:oMath xmlns:m="http://schemas.openxmlformats.org/officeDocument/2006/math">
+                    <m:r>
+                      <a:rPr lang="en-US" i="1" dirty="0" smtClean="0">
+                        <a:latin typeface="Cambria Math" panose="02040503050406030204" pitchFamily="18" charset="0"/>
+                      </a:rPr>
+                      <m:t>𝑐</m:t>
+                    </m:r>
+                    <m:r>
+                      <a:rPr lang="en-US" i="1" dirty="0" smtClean="0">
+                        <a:latin typeface="Cambria Math" panose="02040503050406030204" pitchFamily="18" charset="0"/>
+                      </a:rPr>
+                      <m:t>=16</m:t>
+                    </m:r>
+                  </m:oMath>
+                </a14:m>
+                <a:endParaRPr lang="en-US" dirty="0"/>
+              </a:p>
+              <a:p>
+                <a14:m>
+                  <m:oMath xmlns:m="http://schemas.openxmlformats.org/officeDocument/2006/math">
+                    <m:r>
+                      <a:rPr lang="en-US" i="1" dirty="0" smtClean="0">
+                        <a:latin typeface="Cambria Math" panose="02040503050406030204" pitchFamily="18" charset="0"/>
+                      </a:rPr>
+                      <m:t>𝑇</m:t>
+                    </m:r>
+                    <m:r>
+                      <a:rPr lang="en-US" i="1" dirty="0" smtClean="0">
+                        <a:latin typeface="Cambria Math" panose="02040503050406030204" pitchFamily="18" charset="0"/>
+                      </a:rPr>
+                      <m:t>=</m:t>
+                    </m:r>
+                    <m:r>
+                      <a:rPr lang="en-US" i="1" dirty="0" smtClean="0">
+                        <a:latin typeface="Cambria Math" panose="02040503050406030204" pitchFamily="18" charset="0"/>
+                      </a:rPr>
+                      <m:t>𝐿</m:t>
+                    </m:r>
+                  </m:oMath>
+                </a14:m>
+                <a:endParaRPr lang="en-US" dirty="0"/>
+              </a:p>
+              <a:p>
+                <a14:m>
+                  <m:oMath xmlns:m="http://schemas.openxmlformats.org/officeDocument/2006/math">
+                    <m:r>
+                      <a:rPr lang="en-US" b="1" i="1" dirty="0" smtClean="0">
+                        <a:latin typeface="Cambria Math" panose="02040503050406030204" pitchFamily="18" charset="0"/>
+                      </a:rPr>
+                      <m:t>𝒑</m:t>
+                    </m:r>
+                    <m:r>
+                      <a:rPr lang="en-US" b="1" i="1" dirty="0" smtClean="0">
+                        <a:latin typeface="Cambria Math" panose="02040503050406030204" pitchFamily="18" charset="0"/>
+                      </a:rPr>
+                      <m:t>∈{</m:t>
+                    </m:r>
+                    <m:r>
+                      <a:rPr lang="en-US" b="1" i="1" dirty="0" smtClean="0">
+                        <a:latin typeface="Cambria Math" panose="02040503050406030204" pitchFamily="18" charset="0"/>
+                      </a:rPr>
+                      <m:t>𝟎</m:t>
+                    </m:r>
+                    <m:r>
+                      <a:rPr lang="en-US" b="1" i="1" dirty="0" smtClean="0">
+                        <a:latin typeface="Cambria Math" panose="02040503050406030204" pitchFamily="18" charset="0"/>
+                      </a:rPr>
+                      <m:t>.</m:t>
+                    </m:r>
+                    <m:r>
+                      <a:rPr lang="en-US" b="1" i="1" dirty="0" smtClean="0">
+                        <a:latin typeface="Cambria Math" panose="02040503050406030204" pitchFamily="18" charset="0"/>
+                      </a:rPr>
+                      <m:t>𝟎𝟎𝟒𝟎𝟎</m:t>
+                    </m:r>
+                    <m:r>
+                      <a:rPr lang="en-US" b="1" i="1" dirty="0" smtClean="0">
+                        <a:latin typeface="Cambria Math" panose="02040503050406030204" pitchFamily="18" charset="0"/>
+                      </a:rPr>
+                      <m:t>,</m:t>
+                    </m:r>
+                    <m:r>
+                      <a:rPr lang="en-US" b="1" i="1" dirty="0" smtClean="0">
+                        <a:latin typeface="Cambria Math" panose="02040503050406030204" pitchFamily="18" charset="0"/>
+                      </a:rPr>
+                      <m:t>𝟎</m:t>
+                    </m:r>
+                    <m:r>
+                      <a:rPr lang="en-US" b="1" i="1" dirty="0" smtClean="0">
+                        <a:latin typeface="Cambria Math" panose="02040503050406030204" pitchFamily="18" charset="0"/>
+                      </a:rPr>
+                      <m:t>.</m:t>
+                    </m:r>
+                    <m:r>
+                      <a:rPr lang="en-US" b="1" i="1" dirty="0" smtClean="0">
+                        <a:latin typeface="Cambria Math" panose="02040503050406030204" pitchFamily="18" charset="0"/>
+                      </a:rPr>
+                      <m:t>𝟎𝟎𝟒𝟎𝟏</m:t>
+                    </m:r>
+                    <m:r>
+                      <a:rPr lang="en-US" b="1" i="1" dirty="0" smtClean="0">
+                        <a:latin typeface="Cambria Math" panose="02040503050406030204" pitchFamily="18" charset="0"/>
+                      </a:rPr>
+                      <m:t>,</m:t>
+                    </m:r>
+                    <m:r>
+                      <a:rPr lang="en-US" b="1" i="1" dirty="0" smtClean="0">
+                        <a:latin typeface="Cambria Math" panose="02040503050406030204" pitchFamily="18" charset="0"/>
+                      </a:rPr>
+                      <m:t>𝟎</m:t>
+                    </m:r>
+                    <m:r>
+                      <a:rPr lang="en-US" b="1" i="1" dirty="0" smtClean="0">
+                        <a:latin typeface="Cambria Math" panose="02040503050406030204" pitchFamily="18" charset="0"/>
+                      </a:rPr>
+                      <m:t>.</m:t>
+                    </m:r>
+                    <m:r>
+                      <a:rPr lang="en-US" b="1" i="1" dirty="0" smtClean="0">
+                        <a:latin typeface="Cambria Math" panose="02040503050406030204" pitchFamily="18" charset="0"/>
+                      </a:rPr>
+                      <m:t>𝟎𝟎𝟒𝟎𝟐</m:t>
+                    </m:r>
+                    <m:r>
+                      <a:rPr lang="en-US" b="1" i="1" dirty="0" smtClean="0">
+                        <a:latin typeface="Cambria Math" panose="02040503050406030204" pitchFamily="18" charset="0"/>
+                      </a:rPr>
+                      <m:t>,…,</m:t>
+                    </m:r>
+                    <m:r>
+                      <a:rPr lang="en-US" b="1" i="1" dirty="0" smtClean="0">
+                        <a:latin typeface="Cambria Math" panose="02040503050406030204" pitchFamily="18" charset="0"/>
+                      </a:rPr>
+                      <m:t>𝟎</m:t>
+                    </m:r>
+                    <m:r>
+                      <a:rPr lang="en-US" b="1" i="1" dirty="0" smtClean="0">
+                        <a:latin typeface="Cambria Math" panose="02040503050406030204" pitchFamily="18" charset="0"/>
+                      </a:rPr>
+                      <m:t>.</m:t>
+                    </m:r>
+                    <m:r>
+                      <a:rPr lang="en-US" b="1" i="1" dirty="0" smtClean="0">
+                        <a:latin typeface="Cambria Math" panose="02040503050406030204" pitchFamily="18" charset="0"/>
+                      </a:rPr>
+                      <m:t>𝟎𝟎𝟒𝟏𝟗</m:t>
+                    </m:r>
+                    <m:r>
+                      <m:rPr>
+                        <m:lit/>
+                      </m:rPr>
+                      <a:rPr lang="en-US" b="1" i="1" dirty="0" smtClean="0">
+                        <a:latin typeface="Cambria Math" panose="02040503050406030204" pitchFamily="18" charset="0"/>
+                      </a:rPr>
+                      <m:t>}</m:t>
+                    </m:r>
+                  </m:oMath>
+                </a14:m>
+                <a:endParaRPr lang="en-US" b="1" dirty="0"/>
+              </a:p>
+              <a:p>
+                <a14:m>
+                  <m:oMath xmlns:m="http://schemas.openxmlformats.org/officeDocument/2006/math">
+                    <m:r>
+                      <a:rPr lang="en-US" i="1" dirty="0" smtClean="0">
+                        <a:latin typeface="Cambria Math" panose="02040503050406030204" pitchFamily="18" charset="0"/>
+                      </a:rPr>
+                      <m:t>𝜂</m:t>
+                    </m:r>
+                    <m:r>
+                      <a:rPr lang="en-US" i="1" dirty="0" smtClean="0">
+                        <a:latin typeface="Cambria Math" panose="02040503050406030204" pitchFamily="18" charset="0"/>
+                      </a:rPr>
+                      <m:t>=0.1</m:t>
+                    </m:r>
+                  </m:oMath>
+                </a14:m>
+                <a:endParaRPr lang="en-US" dirty="0"/>
+              </a:p>
+              <a:p>
+                <a:r>
+                  <a:rPr lang="en-US" dirty="0"/>
+                  <a:t>12 hours x 10, 1 GPU / task</a:t>
+                </a:r>
+              </a:p>
+            </p:txBody>
+          </p:sp>
+        </mc:Choice>
+        <mc:Fallback>
+          <p:sp>
+            <p:nvSpPr>
+              <p:cNvPr id="3" name="Content Placeholder 2">
+                <a:extLst>
+                  <a:ext uri="{FF2B5EF4-FFF2-40B4-BE49-F238E27FC236}">
+                    <a16:creationId xmlns:a16="http://schemas.microsoft.com/office/drawing/2014/main" id="{F567ADB7-F744-B166-BEF6-BB2549F8A4D4}"/>
+                  </a:ext>
+                </a:extLst>
+              </p:cNvPr>
+              <p:cNvSpPr>
+                <a:spLocks noGrp="1" noRot="1" noChangeAspect="1" noMove="1" noResize="1" noEditPoints="1" noAdjustHandles="1" noChangeArrowheads="1" noChangeShapeType="1" noTextEdit="1"/>
+              </p:cNvSpPr>
+              <p:nvPr>
+                <p:ph idx="1"/>
+              </p:nvPr>
+            </p:nvSpPr>
+            <p:spPr>
+              <a:blipFill>
+                <a:blip r:embed="rId2"/>
+                <a:stretch>
+                  <a:fillRect l="-1043"/>
+                </a:stretch>
+              </a:blipFill>
+            </p:spPr>
+            <p:txBody>
+              <a:bodyPr/>
+              <a:lstStyle/>
+              <a:p>
+                <a:r>
+                  <a:rPr lang="en-US">
+                    <a:noFill/>
+                  </a:rPr>
+                  <a:t> </a:t>
+                </a:r>
+              </a:p>
+            </p:txBody>
+          </p:sp>
+        </mc:Fallback>
+      </mc:AlternateContent>
+    </p:spTree>
+    <p:extLst>
+      <p:ext uri="{BB962C8B-B14F-4D97-AF65-F5344CB8AC3E}">
+        <p14:creationId xmlns:p14="http://schemas.microsoft.com/office/powerpoint/2010/main" val="3117434292"/>
+      </p:ext>
+    </p:extLst>
+  </p:cSld>
+  <p:clrMapOvr>
+    <a:masterClrMapping/>
+  </p:clrMapOvr>
+</p:sld>
+</file>
+
+<file path=ppt/slides/slide42.xml><?xml version="1.0" encoding="utf-8"?>
+<p:sld xmlns:a="http://schemas.openxmlformats.org/drawingml/2006/main" xmlns:r="http://schemas.openxmlformats.org/officeDocument/2006/relationships" xmlns:p="http://schemas.openxmlformats.org/presentationml/2006/main">
+  <p:cSld>
+    <p:spTree>
+      <p:nvGrpSpPr>
+        <p:cNvPr id="1" name=""/>
+        <p:cNvGrpSpPr/>
+        <p:nvPr/>
+      </p:nvGrpSpPr>
+      <p:grpSpPr>
+        <a:xfrm>
+          <a:off x="0" y="0"/>
+          <a:ext cx="0" cy="0"/>
+          <a:chOff x="0" y="0"/>
+          <a:chExt cx="0" cy="0"/>
+        </a:xfrm>
+      </p:grpSpPr>
+      <p:sp>
+        <p:nvSpPr>
+          <p:cNvPr id="2" name="Title 1">
+            <a:extLst>
+              <a:ext uri="{FF2B5EF4-FFF2-40B4-BE49-F238E27FC236}">
+                <a16:creationId xmlns:a16="http://schemas.microsoft.com/office/drawing/2014/main" id="{B7203A3C-CAA9-71FB-9124-C235662153F9}"/>
+              </a:ext>
+            </a:extLst>
+          </p:cNvPr>
+          <p:cNvSpPr>
+            <a:spLocks noGrp="1"/>
+          </p:cNvSpPr>
+          <p:nvPr>
+            <p:ph type="title"/>
+          </p:nvPr>
+        </p:nvSpPr>
+        <p:spPr/>
+        <p:txBody>
+          <a:bodyPr/>
+          <a:lstStyle/>
+          <a:p>
+            <a:r>
+              <a:rPr lang="en-US" dirty="0"/>
+              <a:t>Run 13</a:t>
+            </a:r>
+          </a:p>
+        </p:txBody>
+      </p:sp>
+      <p:pic>
+        <p:nvPicPr>
+          <p:cNvPr id="5" name="Content Placeholder 4" descr="A screenshot of a computer screen&#10;&#10;Description automatically generated">
+            <a:extLst>
+              <a:ext uri="{FF2B5EF4-FFF2-40B4-BE49-F238E27FC236}">
+                <a16:creationId xmlns:a16="http://schemas.microsoft.com/office/drawing/2014/main" id="{606A2921-6602-177A-5CF4-E7EB245A400D}"/>
+              </a:ext>
+            </a:extLst>
+          </p:cNvPr>
+          <p:cNvPicPr>
+            <a:picLocks noGrp="1" noChangeAspect="1"/>
+          </p:cNvPicPr>
+          <p:nvPr>
+            <p:ph idx="1"/>
+          </p:nvPr>
+        </p:nvPicPr>
+        <p:blipFill>
+          <a:blip r:embed="rId2">
+            <a:extLst>
+              <a:ext uri="{28A0092B-C50C-407E-A947-70E740481C1C}">
+                <a14:useLocalDpi xmlns:a14="http://schemas.microsoft.com/office/drawing/2010/main" val="0"/>
+              </a:ext>
+            </a:extLst>
+          </a:blip>
+          <a:stretch>
+            <a:fillRect/>
+          </a:stretch>
+        </p:blipFill>
+        <p:spPr>
+          <a:xfrm>
+            <a:off x="0" y="2087427"/>
+            <a:ext cx="12144462" cy="3297907"/>
+          </a:xfrm>
+        </p:spPr>
+      </p:pic>
+    </p:spTree>
+    <p:extLst>
+      <p:ext uri="{BB962C8B-B14F-4D97-AF65-F5344CB8AC3E}">
+        <p14:creationId xmlns:p14="http://schemas.microsoft.com/office/powerpoint/2010/main" val="2661753421"/>
+      </p:ext>
+    </p:extLst>
+  </p:cSld>
+  <p:clrMapOvr>
+    <a:masterClrMapping/>
+  </p:clrMapOvr>
+</p:sld>
+</file>
+
+<file path=ppt/slides/slide43.xml><?xml version="1.0" encoding="utf-8"?>
+<p:sld xmlns:a="http://schemas.openxmlformats.org/drawingml/2006/main" xmlns:r="http://schemas.openxmlformats.org/officeDocument/2006/relationships" xmlns:p="http://schemas.openxmlformats.org/presentationml/2006/main">
+  <p:cSld>
+    <p:spTree>
+      <p:nvGrpSpPr>
+        <p:cNvPr id="1" name=""/>
+        <p:cNvGrpSpPr/>
+        <p:nvPr/>
+      </p:nvGrpSpPr>
+      <p:grpSpPr>
+        <a:xfrm>
+          <a:off x="0" y="0"/>
+          <a:ext cx="0" cy="0"/>
+          <a:chOff x="0" y="0"/>
+          <a:chExt cx="0" cy="0"/>
+        </a:xfrm>
+      </p:grpSpPr>
+      <p:sp>
+        <p:nvSpPr>
+          <p:cNvPr id="2" name="Title 1">
+            <a:extLst>
+              <a:ext uri="{FF2B5EF4-FFF2-40B4-BE49-F238E27FC236}">
+                <a16:creationId xmlns:a16="http://schemas.microsoft.com/office/drawing/2014/main" id="{B2BBFA49-E701-78D7-DBDE-518274627A56}"/>
+              </a:ext>
+            </a:extLst>
+          </p:cNvPr>
+          <p:cNvSpPr>
+            <a:spLocks noGrp="1"/>
+          </p:cNvSpPr>
+          <p:nvPr>
+            <p:ph type="title"/>
+          </p:nvPr>
+        </p:nvSpPr>
+        <p:spPr/>
+        <p:txBody>
+          <a:bodyPr/>
+          <a:lstStyle/>
+          <a:p>
+            <a:r>
+              <a:rPr lang="en-US" dirty="0"/>
+              <a:t>Run 13</a:t>
+            </a:r>
+          </a:p>
+        </p:txBody>
+      </p:sp>
+      <p:pic>
+        <p:nvPicPr>
+          <p:cNvPr id="5" name="Content Placeholder 4" descr="A graph of different colored lines&#10;&#10;Description automatically generated">
+            <a:extLst>
+              <a:ext uri="{FF2B5EF4-FFF2-40B4-BE49-F238E27FC236}">
+                <a16:creationId xmlns:a16="http://schemas.microsoft.com/office/drawing/2014/main" id="{DF5965D8-6FE5-A62E-6672-A6FD0309CC10}"/>
+              </a:ext>
+            </a:extLst>
+          </p:cNvPr>
+          <p:cNvPicPr>
+            <a:picLocks noGrp="1" noChangeAspect="1"/>
+          </p:cNvPicPr>
+          <p:nvPr>
+            <p:ph idx="1"/>
+          </p:nvPr>
+        </p:nvPicPr>
+        <p:blipFill>
+          <a:blip r:embed="rId2">
+            <a:extLst>
+              <a:ext uri="{28A0092B-C50C-407E-A947-70E740481C1C}">
+                <a14:useLocalDpi xmlns:a14="http://schemas.microsoft.com/office/drawing/2010/main" val="0"/>
+              </a:ext>
+            </a:extLst>
+          </a:blip>
+          <a:stretch>
+            <a:fillRect/>
+          </a:stretch>
+        </p:blipFill>
+        <p:spPr>
+          <a:xfrm>
+            <a:off x="-4593" y="1522216"/>
+            <a:ext cx="5939242" cy="4681265"/>
+          </a:xfrm>
+        </p:spPr>
+      </p:pic>
+      <p:pic>
+        <p:nvPicPr>
+          <p:cNvPr id="7" name="Picture 6" descr="A graph of different colored lines&#10;&#10;Description automatically generated">
+            <a:extLst>
+              <a:ext uri="{FF2B5EF4-FFF2-40B4-BE49-F238E27FC236}">
+                <a16:creationId xmlns:a16="http://schemas.microsoft.com/office/drawing/2014/main" id="{4535A5AE-4C43-7F14-B4B6-C559DBFE8644}"/>
+              </a:ext>
+            </a:extLst>
+          </p:cNvPr>
+          <p:cNvPicPr>
+            <a:picLocks noChangeAspect="1"/>
+          </p:cNvPicPr>
+          <p:nvPr/>
+        </p:nvPicPr>
+        <p:blipFill>
+          <a:blip r:embed="rId3">
+            <a:extLst>
+              <a:ext uri="{28A0092B-C50C-407E-A947-70E740481C1C}">
+                <a14:useLocalDpi xmlns:a14="http://schemas.microsoft.com/office/drawing/2010/main" val="0"/>
+              </a:ext>
+            </a:extLst>
+          </a:blip>
+          <a:stretch>
+            <a:fillRect/>
+          </a:stretch>
+        </p:blipFill>
+        <p:spPr>
+          <a:xfrm>
+            <a:off x="5934649" y="1522215"/>
+            <a:ext cx="6257351" cy="4681265"/>
+          </a:xfrm>
+          <a:prstGeom prst="rect">
+            <a:avLst/>
+          </a:prstGeom>
+        </p:spPr>
+      </p:pic>
+    </p:spTree>
+    <p:extLst>
+      <p:ext uri="{BB962C8B-B14F-4D97-AF65-F5344CB8AC3E}">
+        <p14:creationId xmlns:p14="http://schemas.microsoft.com/office/powerpoint/2010/main" val="532840563"/>
+      </p:ext>
+    </p:extLst>
+  </p:cSld>
+  <p:clrMapOvr>
+    <a:masterClrMapping/>
+  </p:clrMapOvr>
+</p:sld>
+</file>
+
 <file path=ppt/slides/slide5.xml><?xml version="1.0" encoding="utf-8"?>
 <p:sld xmlns:a="http://schemas.openxmlformats.org/drawingml/2006/main" xmlns:r="http://schemas.openxmlformats.org/officeDocument/2006/relationships" xmlns:p="http://schemas.openxmlformats.org/presentationml/2006/main">
   <p:cSld>

</xml_diff>